<commit_message>
Small improvements to JS basics.
</commit_message>
<xml_diff>
--- a/javascript_basics/JavaScript Basics - basics/JavaScript Basics - basics.pptx
+++ b/javascript_basics/JavaScript Basics - basics/JavaScript Basics - basics.pptx
@@ -5,10 +5,10 @@
     <p:sldMasterId id="2147483648" r:id="rId1"/>
   </p:sldMasterIdLst>
   <p:notesMasterIdLst>
-    <p:notesMasterId r:id="rId23"/>
+    <p:notesMasterId r:id="rId22"/>
   </p:notesMasterIdLst>
   <p:handoutMasterIdLst>
-    <p:handoutMasterId r:id="rId24"/>
+    <p:handoutMasterId r:id="rId23"/>
   </p:handoutMasterIdLst>
   <p:sldIdLst>
     <p:sldId id="256" r:id="rId2"/>
@@ -18,32 +18,31 @@
     <p:sldId id="264" r:id="rId6"/>
     <p:sldId id="265" r:id="rId7"/>
     <p:sldId id="279" r:id="rId8"/>
-    <p:sldId id="259" r:id="rId9"/>
+    <p:sldId id="282" r:id="rId9"/>
     <p:sldId id="266" r:id="rId10"/>
     <p:sldId id="267" r:id="rId11"/>
     <p:sldId id="268" r:id="rId12"/>
-    <p:sldId id="269" r:id="rId13"/>
-    <p:sldId id="270" r:id="rId14"/>
-    <p:sldId id="271" r:id="rId15"/>
-    <p:sldId id="272" r:id="rId16"/>
-    <p:sldId id="274" r:id="rId17"/>
-    <p:sldId id="276" r:id="rId18"/>
-    <p:sldId id="273" r:id="rId19"/>
-    <p:sldId id="275" r:id="rId20"/>
-    <p:sldId id="277" r:id="rId21"/>
-    <p:sldId id="280" r:id="rId22"/>
+    <p:sldId id="270" r:id="rId13"/>
+    <p:sldId id="271" r:id="rId14"/>
+    <p:sldId id="272" r:id="rId15"/>
+    <p:sldId id="274" r:id="rId16"/>
+    <p:sldId id="276" r:id="rId17"/>
+    <p:sldId id="273" r:id="rId18"/>
+    <p:sldId id="275" r:id="rId19"/>
+    <p:sldId id="277" r:id="rId20"/>
+    <p:sldId id="280" r:id="rId21"/>
   </p:sldIdLst>
   <p:sldSz cx="9144000" cy="6858000" type="screen4x3"/>
   <p:notesSz cx="6858000" cy="9144000"/>
   <p:embeddedFontLst>
     <p:embeddedFont>
       <p:font typeface="AA Zuehlke" panose="02000503060000020004" pitchFamily="2" charset="0"/>
-      <p:regular r:id="rId25"/>
-      <p:italic r:id="rId26"/>
+      <p:regular r:id="rId24"/>
+      <p:italic r:id="rId25"/>
     </p:embeddedFont>
   </p:embeddedFontLst>
   <p:custDataLst>
-    <p:tags r:id="rId27"/>
+    <p:tags r:id="rId26"/>
   </p:custDataLst>
   <p:defaultTextStyle>
     <a:defPPr>
@@ -156,7 +155,7 @@
             <p14:sldId id="264"/>
             <p14:sldId id="265"/>
             <p14:sldId id="279"/>
-            <p14:sldId id="259"/>
+            <p14:sldId id="282"/>
           </p14:sldIdLst>
         </p14:section>
         <p14:section name="Operators" id="{CC907239-0754-4E88-8BB6-22DC90CDEDA8}">
@@ -164,7 +163,6 @@
             <p14:sldId id="266"/>
             <p14:sldId id="267"/>
             <p14:sldId id="268"/>
-            <p14:sldId id="269"/>
             <p14:sldId id="270"/>
           </p14:sldIdLst>
         </p14:section>
@@ -329,7 +327,7 @@
               <a:rPr lang="de-DE" smtClean="0">
                 <a:latin typeface="AA Zuehlke" pitchFamily="2" charset="0"/>
               </a:rPr>
-              <a:t>23.08.2015</a:t>
+              <a:t>04.09.2015</a:t>
             </a:fld>
             <a:endParaRPr lang="de-DE">
               <a:latin typeface="AA Zuehlke" pitchFamily="2" charset="0"/>
@@ -507,7 +505,7 @@
             <a:fld id="{A6966AE6-B72D-4967-9CA3-8469D2863705}" type="datetimeFigureOut">
               <a:rPr lang="en-US" smtClean="0"/>
               <a:pPr/>
-              <a:t>8/23/2015</a:t>
+              <a:t>9/4/2015</a:t>
             </a:fld>
             <a:endParaRPr lang="en-US" dirty="0"/>
           </a:p>
@@ -7025,16 +7023,8 @@
           <a:lstStyle/>
           <a:p>
             <a:r>
-              <a:rPr lang="en-US" b="1" dirty="0" smtClean="0"/>
-              <a:t>delete</a:t>
-            </a:r>
-            <a:r>
-              <a:rPr lang="en-US" dirty="0" smtClean="0"/>
-              <a:t>, </a:t>
-            </a:r>
-            <a:r>
-              <a:rPr lang="en-US" b="1" dirty="0" smtClean="0"/>
-              <a:t>in</a:t>
+              <a:rPr lang="en-US" b="1" dirty="0" err="1" smtClean="0"/>
+              <a:t>instanceof</a:t>
             </a:r>
             <a:endParaRPr lang="en-US" b="1" dirty="0"/>
           </a:p>
@@ -7060,46 +7050,8 @@
               <a:buChar char="•"/>
             </a:pPr>
             <a:r>
-              <a:rPr lang="en-US" b="1" dirty="0" smtClean="0"/>
-              <a:t>delete</a:t>
-            </a:r>
-            <a:r>
-              <a:rPr lang="en-US" dirty="0" smtClean="0"/>
-              <a:t> removes a property from an object or an element from the array</a:t>
-            </a:r>
-            <a:endParaRPr lang="en-US" b="1" dirty="0" smtClean="0"/>
-          </a:p>
-          <a:p>
-            <a:pPr marL="608013" lvl="1" indent="-342900">
-              <a:buFont typeface="Arial" panose="020B0604020202020204" pitchFamily="34" charset="0"/>
-              <a:buChar char="•"/>
-            </a:pPr>
-            <a:r>
-              <a:rPr lang="en-US" b="1" dirty="0" smtClean="0"/>
-              <a:t>delete</a:t>
-            </a:r>
-            <a:r>
-              <a:rPr lang="en-US" dirty="0" smtClean="0"/>
-              <a:t> </a:t>
-            </a:r>
-            <a:r>
-              <a:rPr lang="en-US" dirty="0" err="1"/>
-              <a:t>object.property</a:t>
-            </a:r>
-            <a:endParaRPr lang="en-US" dirty="0"/>
-          </a:p>
-          <a:p>
-            <a:pPr marL="608013" lvl="1" indent="-342900">
-              <a:buFont typeface="Arial" panose="020B0604020202020204" pitchFamily="34" charset="0"/>
-              <a:buChar char="•"/>
-            </a:pPr>
-            <a:r>
-              <a:rPr lang="en-US" b="1" dirty="0" smtClean="0"/>
-              <a:t>delete</a:t>
-            </a:r>
-            <a:r>
-              <a:rPr lang="en-US" dirty="0" smtClean="0"/>
-              <a:t> array[index]</a:t>
+              <a:rPr lang="en-US" dirty="0" smtClean="0"/>
+              <a:t>Checks if an object is in the prototype chain of a constructor</a:t>
             </a:r>
           </a:p>
           <a:p>
@@ -7108,67 +7060,139 @@
               <a:buChar char="•"/>
             </a:pPr>
             <a:r>
-              <a:rPr lang="en-US" b="1" dirty="0" smtClean="0"/>
-              <a:t>delete</a:t>
-            </a:r>
-            <a:r>
-              <a:rPr lang="en-US" dirty="0" smtClean="0"/>
-              <a:t> will make a variable undefined</a:t>
-            </a:r>
-            <a:endParaRPr lang="en-US" b="1" dirty="0" smtClean="0"/>
-          </a:p>
-          <a:p>
-            <a:endParaRPr lang="en-US" dirty="0"/>
+              <a:rPr lang="en-US" dirty="0" smtClean="0"/>
+              <a:t>If an object inherits a certain (anywhere in hierarchy)</a:t>
+            </a:r>
           </a:p>
           <a:p>
             <a:pPr marL="342900" indent="-342900">
               <a:buFont typeface="Arial" panose="020B0604020202020204" pitchFamily="34" charset="0"/>
               <a:buChar char="•"/>
             </a:pPr>
-            <a:r>
-              <a:rPr lang="en-US" b="1" dirty="0" smtClean="0"/>
-              <a:t>in</a:t>
-            </a:r>
-            <a:r>
-              <a:rPr lang="en-US" dirty="0" smtClean="0"/>
-              <a:t> checks if a property exists on an object, or if an element exists in an array</a:t>
-            </a:r>
-          </a:p>
-          <a:p>
-            <a:pPr marL="608013" lvl="1" indent="-342900">
+            <a:endParaRPr lang="en-US" dirty="0" smtClean="0"/>
+          </a:p>
+          <a:p>
+            <a:pPr marL="342900" indent="-342900">
               <a:buFont typeface="Arial" panose="020B0604020202020204" pitchFamily="34" charset="0"/>
               <a:buChar char="•"/>
             </a:pPr>
             <a:r>
               <a:rPr lang="en-US" dirty="0" smtClean="0"/>
-              <a:t>if (property </a:t>
-            </a:r>
-            <a:r>
-              <a:rPr lang="en-US" b="1" dirty="0" smtClean="0"/>
-              <a:t>in</a:t>
-            </a:r>
-            <a:r>
-              <a:rPr lang="en-US" dirty="0" smtClean="0"/>
-              <a:t> object)</a:t>
-            </a:r>
-          </a:p>
-          <a:p>
-            <a:pPr marL="608013" lvl="1" indent="-342900">
-              <a:buFont typeface="Arial" panose="020B0604020202020204" pitchFamily="34" charset="0"/>
-              <a:buChar char="•"/>
+              <a:t>if (object </a:t>
+            </a:r>
+            <a:r>
+              <a:rPr lang="en-US" b="1" dirty="0" err="1"/>
+              <a:t>instanceof</a:t>
+            </a:r>
+            <a:r>
+              <a:rPr lang="en-US" dirty="0"/>
+              <a:t> </a:t>
+            </a:r>
+            <a:r>
+              <a:rPr lang="en-US" dirty="0" smtClean="0"/>
+              <a:t>constructor)</a:t>
+            </a:r>
+          </a:p>
+          <a:p>
+            <a:endParaRPr lang="en-US" dirty="0"/>
+          </a:p>
+          <a:p>
+            <a:pPr>
+              <a:spcBef>
+                <a:spcPts val="0"/>
+              </a:spcBef>
             </a:pPr>
             <a:r>
-              <a:rPr lang="en-US" dirty="0" smtClean="0"/>
-              <a:t>if (index </a:t>
-            </a:r>
-            <a:r>
-              <a:rPr lang="en-US" b="1" dirty="0" smtClean="0"/>
-              <a:t>in</a:t>
-            </a:r>
-            <a:r>
-              <a:rPr lang="en-US" dirty="0" smtClean="0"/>
-              <a:t> array)</a:t>
-            </a:r>
+              <a:rPr lang="en-US" dirty="0" err="1"/>
+              <a:t>var</a:t>
+            </a:r>
+            <a:r>
+              <a:rPr lang="en-US" dirty="0"/>
+              <a:t> </a:t>
+            </a:r>
+            <a:r>
+              <a:rPr lang="en-US" dirty="0" err="1"/>
+              <a:t>myDate</a:t>
+            </a:r>
+            <a:r>
+              <a:rPr lang="en-US" dirty="0"/>
+              <a:t> </a:t>
+            </a:r>
+            <a:r>
+              <a:rPr lang="en-US" dirty="0" smtClean="0"/>
+              <a:t> </a:t>
+            </a:r>
+            <a:r>
+              <a:rPr lang="en-US" dirty="0"/>
+              <a:t>= new Date</a:t>
+            </a:r>
+            <a:r>
+              <a:rPr lang="en-US" dirty="0" smtClean="0"/>
+              <a:t>();</a:t>
+            </a:r>
+          </a:p>
+          <a:p>
+            <a:pPr>
+              <a:spcBef>
+                <a:spcPts val="0"/>
+              </a:spcBef>
+            </a:pPr>
+            <a:r>
+              <a:rPr lang="en-US" dirty="0" smtClean="0"/>
+              <a:t>if (</a:t>
+            </a:r>
+            <a:r>
+              <a:rPr lang="en-US" dirty="0" err="1" smtClean="0"/>
+              <a:t>myDate</a:t>
+            </a:r>
+            <a:r>
+              <a:rPr lang="en-US" dirty="0" smtClean="0"/>
+              <a:t> </a:t>
+            </a:r>
+            <a:r>
+              <a:rPr lang="en-US" dirty="0" err="1"/>
+              <a:t>instanceof</a:t>
+            </a:r>
+            <a:r>
+              <a:rPr lang="en-US" dirty="0"/>
+              <a:t> </a:t>
+            </a:r>
+            <a:r>
+              <a:rPr lang="en-US" dirty="0" smtClean="0"/>
+              <a:t>Date) {</a:t>
+            </a:r>
+          </a:p>
+          <a:p>
+            <a:pPr>
+              <a:spcBef>
+                <a:spcPts val="0"/>
+              </a:spcBef>
+            </a:pPr>
+            <a:r>
+              <a:rPr lang="en-US" dirty="0"/>
+              <a:t>	</a:t>
+            </a:r>
+            <a:r>
+              <a:rPr lang="en-US" dirty="0" smtClean="0"/>
+              <a:t>// will execute</a:t>
+            </a:r>
+          </a:p>
+          <a:p>
+            <a:pPr>
+              <a:spcBef>
+                <a:spcPts val="0"/>
+              </a:spcBef>
+            </a:pPr>
+            <a:r>
+              <a:rPr lang="en-US" dirty="0"/>
+              <a:t>}</a:t>
+            </a:r>
+            <a:endParaRPr lang="en-US" dirty="0" smtClean="0"/>
+          </a:p>
+          <a:p>
+            <a:endParaRPr lang="en-US" dirty="0"/>
+          </a:p>
+          <a:p>
             <a:endParaRPr lang="en-US" dirty="0"/>
           </a:p>
         </p:txBody>
@@ -7336,10 +7360,10 @@
           <a:lstStyle/>
           <a:p>
             <a:r>
-              <a:rPr lang="en-US" b="1" dirty="0" err="1" smtClean="0"/>
-              <a:t>instanceof</a:t>
-            </a:r>
-            <a:endParaRPr lang="en-US" b="1" dirty="0"/>
+              <a:rPr lang="en-US" dirty="0" smtClean="0"/>
+              <a:t>Flow control &amp; loops</a:t>
+            </a:r>
+            <a:endParaRPr lang="en-US" dirty="0"/>
           </a:p>
         </p:txBody>
       </p:sp>
@@ -7353,7 +7377,12 @@
             <p:ph idx="1"/>
           </p:nvPr>
         </p:nvSpPr>
-        <p:spPr/>
+        <p:spPr>
+          <a:xfrm>
+            <a:off x="579438" y="1052737"/>
+            <a:ext cx="8412161" cy="5513164"/>
+          </a:xfrm>
+        </p:spPr>
         <p:txBody>
           <a:bodyPr/>
           <a:lstStyle/>
@@ -7364,8 +7393,53 @@
             </a:pPr>
             <a:r>
               <a:rPr lang="en-US" dirty="0" smtClean="0"/>
-              <a:t>Checks if an object is in the prototype chain of a constructor</a:t>
-            </a:r>
+              <a:t>Flow control:</a:t>
+            </a:r>
+          </a:p>
+          <a:p>
+            <a:pPr marL="608013" lvl="1" indent="-342900">
+              <a:buFont typeface="Arial" panose="020B0604020202020204" pitchFamily="34" charset="0"/>
+              <a:buChar char="•"/>
+            </a:pPr>
+            <a:r>
+              <a:rPr lang="en-US" dirty="0" smtClean="0"/>
+              <a:t>if…else   </a:t>
+            </a:r>
+            <a:r>
+              <a:rPr lang="en-US" dirty="0" smtClean="0"/>
+              <a:t>(think about </a:t>
+            </a:r>
+            <a:r>
+              <a:rPr lang="en-US" dirty="0" smtClean="0"/>
+              <a:t>== vs ===)</a:t>
+            </a:r>
+          </a:p>
+          <a:p>
+            <a:pPr marL="608013" lvl="1" indent="-342900">
+              <a:buFont typeface="Arial" panose="020B0604020202020204" pitchFamily="34" charset="0"/>
+              <a:buChar char="•"/>
+            </a:pPr>
+            <a:r>
+              <a:rPr lang="en-US" dirty="0" smtClean="0"/>
+              <a:t>switch</a:t>
+            </a:r>
+          </a:p>
+          <a:p>
+            <a:pPr marL="608013" lvl="1" indent="-342900">
+              <a:buFont typeface="Arial" panose="020B0604020202020204" pitchFamily="34" charset="0"/>
+              <a:buChar char="•"/>
+            </a:pPr>
+            <a:r>
+              <a:rPr lang="en-US" dirty="0" smtClean="0"/>
+              <a:t>?:</a:t>
+            </a:r>
+          </a:p>
+          <a:p>
+            <a:pPr marL="608013" lvl="1" indent="-342900">
+              <a:buFont typeface="Arial" panose="020B0604020202020204" pitchFamily="34" charset="0"/>
+              <a:buChar char="•"/>
+            </a:pPr>
+            <a:endParaRPr lang="en-US" dirty="0" smtClean="0"/>
           </a:p>
           <a:p>
             <a:pPr marL="342900" indent="-342900">
@@ -7374,7 +7448,7 @@
             </a:pPr>
             <a:r>
               <a:rPr lang="en-US" dirty="0" smtClean="0"/>
-              <a:t>If an object inherits a certain (anywhere in hierarchy)</a:t>
+              <a:t>Loops: for, while, do…while</a:t>
             </a:r>
           </a:p>
           <a:p>
@@ -7391,123 +7465,37 @@
             </a:pPr>
             <a:r>
               <a:rPr lang="en-US" dirty="0" smtClean="0"/>
-              <a:t>if (object </a:t>
-            </a:r>
-            <a:r>
-              <a:rPr lang="en-US" b="1" dirty="0" err="1"/>
-              <a:t>instanceof</a:t>
-            </a:r>
-            <a:r>
-              <a:rPr lang="en-US" dirty="0"/>
-              <a:t> </a:t>
-            </a:r>
-            <a:r>
-              <a:rPr lang="en-US" dirty="0" smtClean="0"/>
-              <a:t>constructor)</a:t>
-            </a:r>
-          </a:p>
-          <a:p>
+              <a:t>Exception handling:</a:t>
+            </a:r>
+          </a:p>
+          <a:p>
+            <a:pPr marL="608013" lvl="1" indent="-342900">
+              <a:buFont typeface="Arial" panose="020B0604020202020204" pitchFamily="34" charset="0"/>
+              <a:buChar char="•"/>
+            </a:pPr>
+            <a:r>
+              <a:rPr lang="en-US" dirty="0" smtClean="0"/>
+              <a:t>throw, try…catch…finally</a:t>
+            </a:r>
+          </a:p>
+          <a:p>
+            <a:pPr marL="608013" lvl="1" indent="-342900">
+              <a:buFont typeface="Arial" panose="020B0604020202020204" pitchFamily="34" charset="0"/>
+              <a:buChar char="•"/>
+            </a:pPr>
             <a:endParaRPr lang="en-US" dirty="0"/>
           </a:p>
           <a:p>
-            <a:pPr>
-              <a:spcBef>
-                <a:spcPts val="0"/>
-              </a:spcBef>
+            <a:pPr marL="342900" indent="-342900">
+              <a:buFont typeface="Arial" panose="020B0604020202020204" pitchFamily="34" charset="0"/>
+              <a:buChar char="•"/>
             </a:pPr>
             <a:r>
-              <a:rPr lang="en-US" dirty="0" err="1"/>
-              <a:t>var</a:t>
-            </a:r>
-            <a:r>
-              <a:rPr lang="en-US" dirty="0"/>
-              <a:t> </a:t>
-            </a:r>
-            <a:r>
-              <a:rPr lang="en-US" dirty="0" err="1"/>
-              <a:t>myDate</a:t>
-            </a:r>
-            <a:r>
-              <a:rPr lang="en-US" dirty="0"/>
-              <a:t> </a:t>
-            </a:r>
-            <a:r>
-              <a:rPr lang="en-US" dirty="0" smtClean="0"/>
-              <a:t> </a:t>
-            </a:r>
-            <a:r>
-              <a:rPr lang="en-US" dirty="0"/>
-              <a:t>= new Date</a:t>
-            </a:r>
-            <a:r>
-              <a:rPr lang="en-US" dirty="0" smtClean="0"/>
-              <a:t>();</a:t>
-            </a:r>
-          </a:p>
-          <a:p>
-            <a:pPr>
-              <a:spcBef>
-                <a:spcPts val="0"/>
-              </a:spcBef>
-            </a:pPr>
-            <a:r>
-              <a:rPr lang="en-US" dirty="0" smtClean="0"/>
-              <a:t>if (</a:t>
-            </a:r>
-            <a:r>
-              <a:rPr lang="en-US" dirty="0" err="1" smtClean="0"/>
-              <a:t>myDate</a:t>
-            </a:r>
-            <a:r>
-              <a:rPr lang="en-US" dirty="0" smtClean="0"/>
-              <a:t> </a:t>
-            </a:r>
-            <a:r>
-              <a:rPr lang="en-US" dirty="0" err="1"/>
-              <a:t>instanceof</a:t>
-            </a:r>
-            <a:r>
-              <a:rPr lang="en-US" dirty="0"/>
-              <a:t> </a:t>
-            </a:r>
-            <a:r>
-              <a:rPr lang="en-US" dirty="0" smtClean="0"/>
-              <a:t>Date) {</a:t>
-            </a:r>
-          </a:p>
-          <a:p>
-            <a:pPr>
-              <a:spcBef>
-                <a:spcPts val="0"/>
-              </a:spcBef>
-            </a:pPr>
-            <a:r>
-              <a:rPr lang="en-US" dirty="0"/>
-              <a:t>	</a:t>
-            </a:r>
-            <a:r>
-              <a:rPr lang="en-US" dirty="0" smtClean="0"/>
-              <a:t>// will execute</a:t>
-            </a:r>
-          </a:p>
-          <a:p>
-            <a:pPr>
-              <a:spcBef>
-                <a:spcPts val="0"/>
-              </a:spcBef>
-            </a:pPr>
-            <a:r>
-              <a:rPr lang="en-US" dirty="0"/>
-              <a:t>}</a:t>
-            </a:r>
-            <a:endParaRPr lang="en-US" dirty="0" smtClean="0"/>
-          </a:p>
-          <a:p>
+              <a:rPr lang="en-US" dirty="0" smtClean="0"/>
+              <a:t>Promises (for asynchronous work)</a:t>
+            </a:r>
             <a:endParaRPr lang="en-US" dirty="0"/>
           </a:p>
-          <a:p>
-            <a:endParaRPr lang="en-US" dirty="0"/>
-          </a:p>
         </p:txBody>
       </p:sp>
       <p:sp>
@@ -7529,25 +7517,6 @@
               <a:rPr lang="en-US" dirty="0" smtClean="0"/>
               <a:t>14. August 2015</a:t>
             </a:r>
-            <a:endParaRPr lang="en-US" dirty="0"/>
-          </a:p>
-        </p:txBody>
-      </p:sp>
-      <p:sp>
-        <p:nvSpPr>
-          <p:cNvPr id="6" name="Text Placeholder 5"/>
-          <p:cNvSpPr>
-            <a:spLocks noGrp="1"/>
-          </p:cNvSpPr>
-          <p:nvPr>
-            <p:ph type="body" sz="quarter" idx="13"/>
-          </p:nvPr>
-        </p:nvSpPr>
-        <p:spPr/>
-        <p:txBody>
-          <a:bodyPr/>
-          <a:lstStyle/>
-          <a:p>
             <a:endParaRPr lang="en-US" dirty="0"/>
           </a:p>
         </p:txBody>
@@ -7673,10 +7642,42 @@
           <a:lstStyle/>
           <a:p>
             <a:r>
-              <a:rPr lang="en-US" dirty="0" smtClean="0"/>
-              <a:t>Flow control &amp; loops</a:t>
-            </a:r>
-            <a:endParaRPr lang="en-US" dirty="0"/>
+              <a:rPr lang="en-US" b="1" dirty="0"/>
+              <a:t>f</a:t>
+            </a:r>
+            <a:r>
+              <a:rPr lang="en-US" b="1" dirty="0" smtClean="0"/>
+              <a:t>or</a:t>
+            </a:r>
+            <a:r>
+              <a:rPr lang="en-US" dirty="0" smtClean="0"/>
+              <a:t> vs </a:t>
+            </a:r>
+            <a:r>
+              <a:rPr lang="en-US" b="1" dirty="0" err="1" smtClean="0"/>
+              <a:t>forEach</a:t>
+            </a:r>
+            <a:r>
+              <a:rPr lang="en-US" b="1" dirty="0" smtClean="0"/>
+              <a:t>()</a:t>
+            </a:r>
+            <a:r>
+              <a:rPr lang="en-US" dirty="0" smtClean="0"/>
+              <a:t> vs </a:t>
+            </a:r>
+            <a:r>
+              <a:rPr lang="en-US" b="1" dirty="0" smtClean="0"/>
+              <a:t>for</a:t>
+            </a:r>
+            <a:r>
+              <a:rPr lang="en-US" dirty="0" smtClean="0"/>
+              <a:t>-</a:t>
+            </a:r>
+            <a:r>
+              <a:rPr lang="en-US" b="1" dirty="0" smtClean="0"/>
+              <a:t>in</a:t>
+            </a:r>
+            <a:endParaRPr lang="en-US" b="1" dirty="0"/>
           </a:p>
         </p:txBody>
       </p:sp>
@@ -7692,112 +7693,281 @@
         </p:nvSpPr>
         <p:spPr>
           <a:xfrm>
-            <a:off x="579438" y="1052737"/>
-            <a:ext cx="8412161" cy="5513164"/>
+            <a:off x="579438" y="933885"/>
+            <a:ext cx="8412161" cy="5632015"/>
           </a:xfrm>
         </p:spPr>
         <p:txBody>
           <a:bodyPr/>
           <a:lstStyle/>
           <a:p>
+            <a:r>
+              <a:rPr lang="en-GB" b="1" dirty="0"/>
+              <a:t>for</a:t>
+            </a:r>
+            <a:r>
+              <a:rPr lang="en-GB" dirty="0"/>
+              <a:t> (</a:t>
+            </a:r>
+            <a:r>
+              <a:rPr lang="en-GB" dirty="0" err="1"/>
+              <a:t>i</a:t>
+            </a:r>
+            <a:r>
+              <a:rPr lang="en-GB" dirty="0"/>
+              <a:t> = 0; </a:t>
+            </a:r>
+            <a:r>
+              <a:rPr lang="en-GB" dirty="0" err="1"/>
+              <a:t>i</a:t>
+            </a:r>
+            <a:r>
+              <a:rPr lang="en-GB" dirty="0"/>
+              <a:t> &lt; </a:t>
+            </a:r>
+            <a:r>
+              <a:rPr lang="en-GB" dirty="0" err="1" smtClean="0"/>
+              <a:t>array.length</a:t>
+            </a:r>
+            <a:r>
+              <a:rPr lang="en-GB" dirty="0"/>
+              <a:t>; </a:t>
+            </a:r>
+            <a:r>
+              <a:rPr lang="en-GB" dirty="0" err="1"/>
+              <a:t>i</a:t>
+            </a:r>
+            <a:r>
+              <a:rPr lang="en-GB" dirty="0"/>
+              <a:t>++) { </a:t>
+            </a:r>
+            <a:br>
+              <a:rPr lang="en-GB" dirty="0"/>
+            </a:br>
+            <a:r>
+              <a:rPr lang="en-GB" dirty="0"/>
+              <a:t>    text += </a:t>
+            </a:r>
+            <a:r>
+              <a:rPr lang="en-GB" dirty="0" smtClean="0"/>
+              <a:t>array[</a:t>
+            </a:r>
+            <a:r>
+              <a:rPr lang="en-GB" dirty="0" err="1" smtClean="0"/>
+              <a:t>i</a:t>
+            </a:r>
+            <a:r>
+              <a:rPr lang="en-GB" dirty="0" smtClean="0"/>
+              <a:t>];</a:t>
+            </a:r>
+            <a:r>
+              <a:rPr lang="en-GB" dirty="0"/>
+              <a:t/>
+            </a:r>
+            <a:br>
+              <a:rPr lang="en-GB" dirty="0"/>
+            </a:br>
+            <a:r>
+              <a:rPr lang="en-GB" dirty="0" smtClean="0"/>
+              <a:t>}</a:t>
+            </a:r>
+          </a:p>
+          <a:p>
+            <a:endParaRPr lang="en-GB" dirty="0" smtClean="0"/>
+          </a:p>
+          <a:p>
+            <a:pPr>
+              <a:spcBef>
+                <a:spcPts val="0"/>
+              </a:spcBef>
+            </a:pPr>
+            <a:r>
+              <a:rPr lang="en-GB" dirty="0" smtClean="0"/>
+              <a:t>array.</a:t>
+            </a:r>
+            <a:r>
+              <a:rPr lang="en-US" b="1" dirty="0" err="1" smtClean="0"/>
+              <a:t>forEach</a:t>
+            </a:r>
+            <a:r>
+              <a:rPr lang="en-US" b="1" dirty="0" smtClean="0"/>
+              <a:t>(</a:t>
+            </a:r>
+            <a:r>
+              <a:rPr lang="en-GB" dirty="0"/>
+              <a:t>function (value, index, </a:t>
+            </a:r>
+            <a:r>
+              <a:rPr lang="en-GB" dirty="0" err="1" smtClean="0"/>
+              <a:t>arr</a:t>
+            </a:r>
+            <a:r>
+              <a:rPr lang="en-GB" dirty="0" smtClean="0"/>
+              <a:t>) </a:t>
+            </a:r>
+            <a:r>
+              <a:rPr lang="en-GB" dirty="0"/>
+              <a:t>{</a:t>
+            </a:r>
+          </a:p>
+          <a:p>
+            <a:pPr>
+              <a:spcBef>
+                <a:spcPts val="0"/>
+              </a:spcBef>
+            </a:pPr>
+            <a:r>
+              <a:rPr lang="en-GB" dirty="0"/>
+              <a:t> </a:t>
+            </a:r>
+            <a:r>
+              <a:rPr lang="en-GB" dirty="0" smtClean="0"/>
+              <a:t>     text </a:t>
+            </a:r>
+            <a:r>
+              <a:rPr lang="en-GB" dirty="0"/>
+              <a:t>+= value</a:t>
+            </a:r>
+            <a:r>
+              <a:rPr lang="en-GB" dirty="0" smtClean="0"/>
+              <a:t>;</a:t>
+            </a:r>
+            <a:endParaRPr lang="en-GB" dirty="0"/>
+          </a:p>
+          <a:p>
+            <a:pPr>
+              <a:spcBef>
+                <a:spcPts val="0"/>
+              </a:spcBef>
+            </a:pPr>
+            <a:r>
+              <a:rPr lang="en-GB" dirty="0" smtClean="0"/>
+              <a:t>}</a:t>
+            </a:r>
+            <a:r>
+              <a:rPr lang="en-US" dirty="0" smtClean="0"/>
+              <a:t>);</a:t>
+            </a:r>
+          </a:p>
+          <a:p>
+            <a:pPr>
+              <a:spcBef>
+                <a:spcPts val="0"/>
+              </a:spcBef>
+            </a:pPr>
+            <a:endParaRPr lang="en-US" dirty="0"/>
+          </a:p>
+          <a:p>
+            <a:pPr>
+              <a:spcBef>
+                <a:spcPts val="0"/>
+              </a:spcBef>
+            </a:pPr>
+            <a:endParaRPr lang="en-US" dirty="0" smtClean="0"/>
+          </a:p>
+          <a:p>
             <a:pPr marL="342900" indent="-342900">
+              <a:spcBef>
+                <a:spcPts val="0"/>
+              </a:spcBef>
               <a:buFont typeface="Arial" panose="020B0604020202020204" pitchFamily="34" charset="0"/>
               <a:buChar char="•"/>
             </a:pPr>
             <a:r>
               <a:rPr lang="en-US" dirty="0" smtClean="0"/>
-              <a:t>Flow control:</a:t>
-            </a:r>
-          </a:p>
-          <a:p>
-            <a:pPr marL="608013" lvl="1" indent="-342900">
-              <a:buFont typeface="Arial" panose="020B0604020202020204" pitchFamily="34" charset="0"/>
-              <a:buChar char="•"/>
-            </a:pPr>
-            <a:r>
-              <a:rPr lang="en-US" dirty="0" smtClean="0"/>
-              <a:t>if…else   (remember == vs ===)</a:t>
-            </a:r>
-          </a:p>
-          <a:p>
-            <a:pPr marL="608013" lvl="1" indent="-342900">
-              <a:buFont typeface="Arial" panose="020B0604020202020204" pitchFamily="34" charset="0"/>
-              <a:buChar char="•"/>
-            </a:pPr>
-            <a:r>
-              <a:rPr lang="en-US" dirty="0" smtClean="0"/>
-              <a:t>switch</a:t>
-            </a:r>
-          </a:p>
-          <a:p>
-            <a:pPr marL="608013" lvl="1" indent="-342900">
-              <a:buFont typeface="Arial" panose="020B0604020202020204" pitchFamily="34" charset="0"/>
-              <a:buChar char="•"/>
-            </a:pPr>
-            <a:r>
-              <a:rPr lang="en-US" dirty="0" smtClean="0"/>
-              <a:t>?:</a:t>
-            </a:r>
-          </a:p>
-          <a:p>
-            <a:pPr marL="608013" lvl="1" indent="-342900">
-              <a:buFont typeface="Arial" panose="020B0604020202020204" pitchFamily="34" charset="0"/>
-              <a:buChar char="•"/>
+              <a:t>for…in iterating through properties of an object</a:t>
+            </a:r>
+          </a:p>
+          <a:p>
+            <a:pPr>
+              <a:spcBef>
+                <a:spcPts val="0"/>
+              </a:spcBef>
             </a:pPr>
             <a:endParaRPr lang="en-US" dirty="0" smtClean="0"/>
           </a:p>
           <a:p>
-            <a:pPr marL="342900" indent="-342900">
-              <a:buFont typeface="Arial" panose="020B0604020202020204" pitchFamily="34" charset="0"/>
-              <a:buChar char="•"/>
+            <a:pPr>
+              <a:spcBef>
+                <a:spcPts val="0"/>
+              </a:spcBef>
             </a:pPr>
             <a:r>
-              <a:rPr lang="en-US" dirty="0" smtClean="0"/>
-              <a:t>Loops: for, while, do…while</a:t>
-            </a:r>
-          </a:p>
-          <a:p>
-            <a:pPr marL="342900" indent="-342900">
-              <a:buFont typeface="Arial" panose="020B0604020202020204" pitchFamily="34" charset="0"/>
-              <a:buChar char="•"/>
+              <a:rPr lang="en-US" b="1" dirty="0"/>
+              <a:t>for</a:t>
+            </a:r>
+            <a:r>
+              <a:rPr lang="en-US" dirty="0"/>
+              <a:t> </a:t>
+            </a:r>
+            <a:r>
+              <a:rPr lang="en-US" dirty="0" smtClean="0"/>
+              <a:t>(prop </a:t>
+            </a:r>
+            <a:r>
+              <a:rPr lang="en-US" b="1" dirty="0" smtClean="0"/>
+              <a:t>in</a:t>
+            </a:r>
+            <a:r>
+              <a:rPr lang="en-US" dirty="0" smtClean="0"/>
+              <a:t> </a:t>
+            </a:r>
+            <a:r>
+              <a:rPr lang="en-US" dirty="0"/>
+              <a:t>object) </a:t>
+            </a:r>
+            <a:r>
+              <a:rPr lang="en-US" dirty="0" smtClean="0"/>
+              <a:t>{</a:t>
+            </a:r>
+          </a:p>
+          <a:p>
+            <a:pPr>
+              <a:spcBef>
+                <a:spcPts val="0"/>
+              </a:spcBef>
             </a:pPr>
-            <a:endParaRPr lang="en-US" dirty="0" smtClean="0"/>
-          </a:p>
-          <a:p>
-            <a:pPr marL="342900" indent="-342900">
-              <a:buFont typeface="Arial" panose="020B0604020202020204" pitchFamily="34" charset="0"/>
-              <a:buChar char="•"/>
+            <a:r>
+              <a:rPr lang="en-US" dirty="0"/>
+              <a:t> </a:t>
+            </a:r>
+            <a:r>
+              <a:rPr lang="en-US" dirty="0" smtClean="0"/>
+              <a:t>   console.log(prop); // outputs property </a:t>
+            </a:r>
+            <a:r>
+              <a:rPr lang="en-US" b="1" dirty="0" smtClean="0"/>
+              <a:t>name</a:t>
+            </a:r>
+          </a:p>
+          <a:p>
+            <a:pPr>
+              <a:spcBef>
+                <a:spcPts val="0"/>
+              </a:spcBef>
             </a:pPr>
             <a:r>
-              <a:rPr lang="en-US" dirty="0" smtClean="0"/>
-              <a:t>Exception handling:</a:t>
-            </a:r>
-          </a:p>
-          <a:p>
-            <a:pPr marL="608013" lvl="1" indent="-342900">
-              <a:buFont typeface="Arial" panose="020B0604020202020204" pitchFamily="34" charset="0"/>
-              <a:buChar char="•"/>
+              <a:rPr lang="en-US" dirty="0"/>
+              <a:t> </a:t>
+            </a:r>
+            <a:r>
+              <a:rPr lang="en-US" dirty="0" smtClean="0"/>
+              <a:t>   console.log(object[prop]); // outputs property </a:t>
+            </a:r>
+            <a:r>
+              <a:rPr lang="en-US" b="1" dirty="0" smtClean="0"/>
+              <a:t>value</a:t>
+            </a:r>
+          </a:p>
+          <a:p>
+            <a:pPr>
+              <a:spcBef>
+                <a:spcPts val="0"/>
+              </a:spcBef>
             </a:pPr>
             <a:r>
               <a:rPr lang="en-US" dirty="0" smtClean="0"/>
-              <a:t>throw, try…catch…finally</a:t>
-            </a:r>
-          </a:p>
-          <a:p>
-            <a:pPr marL="608013" lvl="1" indent="-342900">
-              <a:buFont typeface="Arial" panose="020B0604020202020204" pitchFamily="34" charset="0"/>
-              <a:buChar char="•"/>
-            </a:pPr>
-            <a:endParaRPr lang="en-US" dirty="0"/>
-          </a:p>
-          <a:p>
-            <a:pPr marL="342900" indent="-342900">
-              <a:buFont typeface="Arial" panose="020B0604020202020204" pitchFamily="34" charset="0"/>
-              <a:buChar char="•"/>
-            </a:pPr>
-            <a:r>
-              <a:rPr lang="en-US" dirty="0" smtClean="0"/>
-              <a:t>Promises (for asynchronous work)</a:t>
+              <a:t>}</a:t>
             </a:r>
             <a:endParaRPr lang="en-US" dirty="0"/>
           </a:p>
@@ -7947,42 +8117,10 @@
           <a:lstStyle/>
           <a:p>
             <a:r>
-              <a:rPr lang="en-US" b="1" dirty="0"/>
-              <a:t>f</a:t>
-            </a:r>
-            <a:r>
-              <a:rPr lang="en-US" b="1" dirty="0" smtClean="0"/>
-              <a:t>or</a:t>
-            </a:r>
-            <a:r>
-              <a:rPr lang="en-US" dirty="0" smtClean="0"/>
-              <a:t> vs </a:t>
-            </a:r>
-            <a:r>
-              <a:rPr lang="en-US" b="1" dirty="0" err="1" smtClean="0"/>
-              <a:t>forEach</a:t>
-            </a:r>
-            <a:r>
-              <a:rPr lang="en-US" b="1" dirty="0" smtClean="0"/>
-              <a:t>()</a:t>
-            </a:r>
-            <a:r>
-              <a:rPr lang="en-US" dirty="0" smtClean="0"/>
-              <a:t> vs </a:t>
-            </a:r>
-            <a:r>
-              <a:rPr lang="en-US" b="1" dirty="0" smtClean="0"/>
-              <a:t>for</a:t>
-            </a:r>
-            <a:r>
-              <a:rPr lang="en-US" dirty="0" smtClean="0"/>
-              <a:t>-</a:t>
-            </a:r>
-            <a:r>
-              <a:rPr lang="en-US" b="1" dirty="0" smtClean="0"/>
-              <a:t>in</a:t>
-            </a:r>
-            <a:endParaRPr lang="en-US" b="1" dirty="0"/>
+              <a:rPr lang="en-US" dirty="0" smtClean="0"/>
+              <a:t>Exception handling</a:t>
+            </a:r>
+            <a:endParaRPr lang="en-US" dirty="0"/>
           </a:p>
         </p:txBody>
       </p:sp>
@@ -8005,171 +8143,6 @@
         <p:txBody>
           <a:bodyPr/>
           <a:lstStyle/>
-          <a:p>
-            <a:r>
-              <a:rPr lang="en-GB" b="1" dirty="0"/>
-              <a:t>for</a:t>
-            </a:r>
-            <a:r>
-              <a:rPr lang="en-GB" dirty="0"/>
-              <a:t> (</a:t>
-            </a:r>
-            <a:r>
-              <a:rPr lang="en-GB" dirty="0" err="1"/>
-              <a:t>i</a:t>
-            </a:r>
-            <a:r>
-              <a:rPr lang="en-GB" dirty="0"/>
-              <a:t> = 0; </a:t>
-            </a:r>
-            <a:r>
-              <a:rPr lang="en-GB" dirty="0" err="1"/>
-              <a:t>i</a:t>
-            </a:r>
-            <a:r>
-              <a:rPr lang="en-GB" dirty="0"/>
-              <a:t> &lt; </a:t>
-            </a:r>
-            <a:r>
-              <a:rPr lang="en-GB" dirty="0" err="1" smtClean="0"/>
-              <a:t>array.length</a:t>
-            </a:r>
-            <a:r>
-              <a:rPr lang="en-GB" dirty="0"/>
-              <a:t>; </a:t>
-            </a:r>
-            <a:r>
-              <a:rPr lang="en-GB" dirty="0" err="1"/>
-              <a:t>i</a:t>
-            </a:r>
-            <a:r>
-              <a:rPr lang="en-GB" dirty="0"/>
-              <a:t>++) { </a:t>
-            </a:r>
-            <a:br>
-              <a:rPr lang="en-GB" dirty="0"/>
-            </a:br>
-            <a:r>
-              <a:rPr lang="en-GB" dirty="0"/>
-              <a:t>    text += </a:t>
-            </a:r>
-            <a:r>
-              <a:rPr lang="en-GB" dirty="0" smtClean="0"/>
-              <a:t>array[</a:t>
-            </a:r>
-            <a:r>
-              <a:rPr lang="en-GB" dirty="0" err="1" smtClean="0"/>
-              <a:t>i</a:t>
-            </a:r>
-            <a:r>
-              <a:rPr lang="en-GB" dirty="0" smtClean="0"/>
-              <a:t>];</a:t>
-            </a:r>
-            <a:r>
-              <a:rPr lang="en-GB" dirty="0"/>
-              <a:t/>
-            </a:r>
-            <a:br>
-              <a:rPr lang="en-GB" dirty="0"/>
-            </a:br>
-            <a:r>
-              <a:rPr lang="en-GB" dirty="0" smtClean="0"/>
-              <a:t>}</a:t>
-            </a:r>
-          </a:p>
-          <a:p>
-            <a:endParaRPr lang="en-GB" dirty="0" smtClean="0"/>
-          </a:p>
-          <a:p>
-            <a:pPr>
-              <a:spcBef>
-                <a:spcPts val="0"/>
-              </a:spcBef>
-            </a:pPr>
-            <a:r>
-              <a:rPr lang="en-GB" dirty="0" smtClean="0"/>
-              <a:t>array.</a:t>
-            </a:r>
-            <a:r>
-              <a:rPr lang="en-US" b="1" dirty="0" err="1" smtClean="0"/>
-              <a:t>forEach</a:t>
-            </a:r>
-            <a:r>
-              <a:rPr lang="en-US" b="1" dirty="0" smtClean="0"/>
-              <a:t>(</a:t>
-            </a:r>
-            <a:r>
-              <a:rPr lang="en-GB" dirty="0"/>
-              <a:t>function (value, index, </a:t>
-            </a:r>
-            <a:r>
-              <a:rPr lang="en-GB" dirty="0" err="1" smtClean="0"/>
-              <a:t>arr</a:t>
-            </a:r>
-            <a:r>
-              <a:rPr lang="en-GB" dirty="0" smtClean="0"/>
-              <a:t>) </a:t>
-            </a:r>
-            <a:r>
-              <a:rPr lang="en-GB" dirty="0"/>
-              <a:t>{</a:t>
-            </a:r>
-          </a:p>
-          <a:p>
-            <a:pPr>
-              <a:spcBef>
-                <a:spcPts val="0"/>
-              </a:spcBef>
-            </a:pPr>
-            <a:r>
-              <a:rPr lang="en-GB" dirty="0"/>
-              <a:t> </a:t>
-            </a:r>
-            <a:r>
-              <a:rPr lang="en-GB" dirty="0" smtClean="0"/>
-              <a:t>     text </a:t>
-            </a:r>
-            <a:r>
-              <a:rPr lang="en-GB" dirty="0"/>
-              <a:t>+= value</a:t>
-            </a:r>
-            <a:r>
-              <a:rPr lang="en-GB" dirty="0" smtClean="0"/>
-              <a:t>;</a:t>
-            </a:r>
-            <a:endParaRPr lang="en-GB" dirty="0"/>
-          </a:p>
-          <a:p>
-            <a:pPr>
-              <a:spcBef>
-                <a:spcPts val="0"/>
-              </a:spcBef>
-            </a:pPr>
-            <a:r>
-              <a:rPr lang="en-GB" dirty="0" smtClean="0"/>
-              <a:t>}</a:t>
-            </a:r>
-            <a:r>
-              <a:rPr lang="en-US" dirty="0" smtClean="0"/>
-              <a:t>);</a:t>
-            </a:r>
-          </a:p>
-          <a:p>
-            <a:pPr>
-              <a:spcBef>
-                <a:spcPts val="0"/>
-              </a:spcBef>
-            </a:pPr>
-            <a:endParaRPr lang="en-US" dirty="0"/>
-          </a:p>
-          <a:p>
-            <a:pPr>
-              <a:spcBef>
-                <a:spcPts val="0"/>
-              </a:spcBef>
-            </a:pPr>
-            <a:endParaRPr lang="en-US" dirty="0" smtClean="0"/>
-          </a:p>
           <a:p>
             <a:pPr marL="342900" indent="-342900">
               <a:spcBef>
@@ -8180,8 +8153,18 @@
             </a:pPr>
             <a:r>
               <a:rPr lang="en-US" dirty="0" smtClean="0"/>
-              <a:t>for…in iterating through properties of an object</a:t>
-            </a:r>
+              <a:t>Throw short circuits the code and “bubbles up” through code until it reaches a catch.</a:t>
+            </a:r>
+          </a:p>
+          <a:p>
+            <a:pPr marL="342900" indent="-342900">
+              <a:spcBef>
+                <a:spcPts val="0"/>
+              </a:spcBef>
+              <a:buFont typeface="Arial" panose="020B0604020202020204" pitchFamily="34" charset="0"/>
+              <a:buChar char="•"/>
+            </a:pPr>
+            <a:endParaRPr lang="en-US" dirty="0" smtClean="0"/>
           </a:p>
           <a:p>
             <a:pPr>
@@ -8198,32 +8181,35 @@
               </a:spcBef>
             </a:pPr>
             <a:r>
-              <a:rPr lang="en-US" b="1" dirty="0"/>
-              <a:t>for</a:t>
+              <a:rPr lang="en-US" dirty="0" smtClean="0"/>
+              <a:t>try </a:t>
             </a:r>
             <a:r>
               <a:rPr lang="en-US" dirty="0"/>
-              <a:t> </a:t>
-            </a:r>
-            <a:r>
-              <a:rPr lang="en-US" dirty="0" smtClean="0"/>
-              <a:t>(prop </a:t>
-            </a:r>
-            <a:r>
-              <a:rPr lang="en-US" b="1" dirty="0" smtClean="0"/>
-              <a:t>in</a:t>
-            </a:r>
-            <a:r>
-              <a:rPr lang="en-US" dirty="0" smtClean="0"/>
-              <a:t> </a:t>
-            </a:r>
-            <a:r>
+              <a:t>{</a:t>
+            </a:r>
+            <a:br>
               <a:rPr lang="en-US" dirty="0"/>
-              <a:t>object) </a:t>
-            </a:r>
-            <a:r>
-              <a:rPr lang="en-US" dirty="0" smtClean="0"/>
-              <a:t>{</a:t>
+            </a:br>
+            <a:r>
+              <a:rPr lang="en-US" dirty="0"/>
+              <a:t>    </a:t>
+            </a:r>
+            <a:r>
+              <a:rPr lang="en-US" dirty="0" smtClean="0"/>
+              <a:t>// </a:t>
+            </a:r>
+            <a:r>
+              <a:rPr lang="en-US" i="1" dirty="0" smtClean="0"/>
+              <a:t>Block </a:t>
+            </a:r>
+            <a:r>
+              <a:rPr lang="en-US" i="1" dirty="0"/>
+              <a:t>of code to </a:t>
+            </a:r>
+            <a:r>
+              <a:rPr lang="en-US" i="1" dirty="0" smtClean="0"/>
+              <a:t>try execute. Throws an error object.</a:t>
             </a:r>
           </a:p>
           <a:p>
@@ -8233,16 +8219,96 @@
               </a:spcBef>
             </a:pPr>
             <a:r>
+              <a:rPr lang="en-US" dirty="0" smtClean="0"/>
+              <a:t>    throw </a:t>
+            </a:r>
+            <a:r>
               <a:rPr lang="en-US" dirty="0"/>
+              <a:t>new Error(message, </a:t>
+            </a:r>
+            <a:r>
+              <a:rPr lang="en-US" dirty="0" err="1"/>
+              <a:t>fileName</a:t>
+            </a:r>
+            <a:r>
+              <a:rPr lang="en-US" dirty="0"/>
+              <a:t>, </a:t>
+            </a:r>
+            <a:r>
+              <a:rPr lang="en-US" dirty="0" err="1"/>
+              <a:t>lineNumber</a:t>
+            </a:r>
+            <a:r>
+              <a:rPr lang="en-US" dirty="0" smtClean="0"/>
+              <a:t>)</a:t>
+            </a:r>
+            <a:r>
+              <a:rPr lang="en-US" i="1" dirty="0"/>
+              <a:t/>
+            </a:r>
+            <a:br>
+              <a:rPr lang="en-US" i="1" dirty="0"/>
+            </a:br>
+            <a:r>
+              <a:rPr lang="en-US" dirty="0"/>
+              <a:t>}</a:t>
+            </a:r>
+            <a:br>
+              <a:rPr lang="en-US" dirty="0"/>
+            </a:br>
+            <a:r>
+              <a:rPr lang="en-US" dirty="0"/>
+              <a:t>catch(err) {</a:t>
+            </a:r>
+            <a:br>
+              <a:rPr lang="en-US" dirty="0"/>
+            </a:br>
+            <a:r>
+              <a:rPr lang="en-US" dirty="0"/>
+              <a:t>   </a:t>
+            </a:r>
+            <a:r>
+              <a:rPr lang="en-US" dirty="0" smtClean="0"/>
+              <a:t>// </a:t>
+            </a:r>
+            <a:r>
+              <a:rPr lang="en-US" i="1" dirty="0" smtClean="0"/>
+              <a:t>Block </a:t>
+            </a:r>
+            <a:r>
+              <a:rPr lang="en-US" i="1" dirty="0"/>
+              <a:t>of code to handle </a:t>
+            </a:r>
+            <a:r>
+              <a:rPr lang="en-US" i="1" dirty="0" smtClean="0"/>
+              <a:t>errors. Executes only if block in </a:t>
+            </a:r>
+            <a:r>
+              <a:rPr lang="en-US" b="1" i="1" dirty="0" smtClean="0"/>
+              <a:t>try</a:t>
+            </a:r>
+            <a:r>
+              <a:rPr lang="en-US" i="1" dirty="0" smtClean="0"/>
               <a:t> </a:t>
             </a:r>
             <a:r>
-              <a:rPr lang="en-US" dirty="0" smtClean="0"/>
-              <a:t>   console.log(prop); // outputs property </a:t>
-            </a:r>
-            <a:r>
-              <a:rPr lang="en-US" b="1" dirty="0" smtClean="0"/>
-              <a:t>name</a:t>
+              <a:rPr lang="en-US" b="1" i="1" dirty="0" smtClean="0"/>
+              <a:t>throws</a:t>
+            </a:r>
+            <a:r>
+              <a:rPr lang="en-US" i="1" dirty="0" smtClean="0"/>
+              <a:t>.</a:t>
+            </a:r>
+            <a:r>
+              <a:rPr lang="en-US" i="1" dirty="0"/>
+              <a:t/>
+            </a:r>
+            <a:br>
+              <a:rPr lang="en-US" i="1" dirty="0"/>
+            </a:br>
+            <a:r>
+              <a:rPr lang="en-US" dirty="0" smtClean="0"/>
+              <a:t>}</a:t>
             </a:r>
           </a:p>
           <a:p>
@@ -8253,15 +8319,7 @@
             </a:pPr>
             <a:r>
               <a:rPr lang="en-US" dirty="0"/>
-              <a:t> </a:t>
-            </a:r>
-            <a:r>
-              <a:rPr lang="en-US" dirty="0" smtClean="0"/>
-              <a:t>   console.log(object[prop]); // outputs property </a:t>
-            </a:r>
-            <a:r>
-              <a:rPr lang="en-US" b="1" dirty="0" smtClean="0"/>
-              <a:t>value</a:t>
+              <a:t>finally {</a:t>
             </a:r>
           </a:p>
           <a:p>
@@ -8271,10 +8329,48 @@
               </a:spcBef>
             </a:pPr>
             <a:r>
+              <a:rPr lang="en-US" i="1" dirty="0"/>
+              <a:t>    </a:t>
+            </a:r>
+            <a:r>
+              <a:rPr lang="en-US" i="1" dirty="0" smtClean="0"/>
+              <a:t>// Block </a:t>
+            </a:r>
+            <a:r>
+              <a:rPr lang="en-US" i="1" dirty="0"/>
+              <a:t>of code to be executed regardless of the </a:t>
+            </a:r>
+            <a:r>
+              <a:rPr lang="en-US" b="1" i="1" dirty="0" smtClean="0"/>
+              <a:t>try</a:t>
+            </a:r>
+            <a:r>
+              <a:rPr lang="en-US" i="1" dirty="0" smtClean="0"/>
+              <a:t>/</a:t>
+            </a:r>
+            <a:r>
+              <a:rPr lang="en-US" b="1" i="1" dirty="0" smtClean="0"/>
+              <a:t>catch</a:t>
+            </a:r>
+            <a:r>
+              <a:rPr lang="en-US" i="1" dirty="0" smtClean="0"/>
+              <a:t> </a:t>
+            </a:r>
+            <a:r>
+              <a:rPr lang="en-US" i="1" dirty="0"/>
+              <a:t>result</a:t>
+            </a:r>
+          </a:p>
+          <a:p>
+            <a:pPr>
+              <a:spcBef>
+                <a:spcPts val="0"/>
+              </a:spcBef>
+            </a:pPr>
+            <a:r>
               <a:rPr lang="en-US" dirty="0" smtClean="0"/>
               <a:t>}</a:t>
             </a:r>
-            <a:endParaRPr lang="en-US" dirty="0"/>
           </a:p>
         </p:txBody>
       </p:sp>
@@ -8439,242 +8535,71 @@
             <p:ph idx="1"/>
           </p:nvPr>
         </p:nvSpPr>
-        <p:spPr>
-          <a:xfrm>
-            <a:off x="579438" y="933885"/>
-            <a:ext cx="8412161" cy="5632015"/>
-          </a:xfrm>
-        </p:spPr>
+        <p:spPr/>
         <p:txBody>
           <a:bodyPr/>
           <a:lstStyle/>
           <a:p>
             <a:pPr marL="342900" indent="-342900">
-              <a:spcBef>
-                <a:spcPts val="0"/>
-              </a:spcBef>
               <a:buFont typeface="Arial" panose="020B0604020202020204" pitchFamily="34" charset="0"/>
               <a:buChar char="•"/>
             </a:pPr>
             <a:r>
               <a:rPr lang="en-US" dirty="0" smtClean="0"/>
-              <a:t>Throw short circuits the code and “bubbles up” through code until it reaches a catch.</a:t>
+              <a:t>Handle </a:t>
+            </a:r>
+            <a:r>
+              <a:rPr lang="en-US" b="1" dirty="0" smtClean="0"/>
+              <a:t>all</a:t>
+            </a:r>
+            <a:r>
+              <a:rPr lang="en-US" dirty="0" smtClean="0"/>
+              <a:t> exceptions that may occur and influence users workflow</a:t>
             </a:r>
           </a:p>
           <a:p>
             <a:pPr marL="342900" indent="-342900">
-              <a:spcBef>
-                <a:spcPts val="0"/>
-              </a:spcBef>
               <a:buFont typeface="Arial" panose="020B0604020202020204" pitchFamily="34" charset="0"/>
               <a:buChar char="•"/>
             </a:pPr>
-            <a:endParaRPr lang="en-US" dirty="0" smtClean="0"/>
-          </a:p>
-          <a:p>
-            <a:pPr>
-              <a:spcBef>
-                <a:spcPts val="0"/>
-              </a:spcBef>
+            <a:r>
+              <a:rPr lang="en-US" dirty="0" smtClean="0"/>
+              <a:t>Do not use exceptions for non-exceptional </a:t>
+            </a:r>
+            <a:r>
+              <a:rPr lang="en-US" dirty="0"/>
+              <a:t>flow </a:t>
+            </a:r>
+            <a:r>
+              <a:rPr lang="en-US" dirty="0" smtClean="0"/>
+              <a:t>control</a:t>
+            </a:r>
+          </a:p>
+          <a:p>
+            <a:pPr marL="342900" indent="-342900">
+              <a:buFont typeface="Arial" panose="020B0604020202020204" pitchFamily="34" charset="0"/>
+              <a:buChar char="•"/>
             </a:pPr>
-            <a:endParaRPr lang="en-US" dirty="0" smtClean="0"/>
-          </a:p>
-          <a:p>
-            <a:pPr>
-              <a:spcBef>
-                <a:spcPts val="0"/>
-              </a:spcBef>
+            <a:endParaRPr lang="en-US" dirty="0"/>
+          </a:p>
+          <a:p>
+            <a:pPr marL="342900" indent="-342900">
+              <a:buFont typeface="Arial" panose="020B0604020202020204" pitchFamily="34" charset="0"/>
+              <a:buChar char="•"/>
             </a:pPr>
             <a:r>
               <a:rPr lang="en-US" dirty="0" smtClean="0"/>
-              <a:t>try </a:t>
-            </a:r>
-            <a:r>
-              <a:rPr lang="en-US" dirty="0"/>
-              <a:t>{</a:t>
-            </a:r>
-            <a:br>
-              <a:rPr lang="en-US" dirty="0"/>
-            </a:br>
-            <a:r>
-              <a:rPr lang="en-US" dirty="0"/>
-              <a:t>    </a:t>
-            </a:r>
-            <a:r>
-              <a:rPr lang="en-US" dirty="0" smtClean="0"/>
-              <a:t>// </a:t>
-            </a:r>
-            <a:r>
-              <a:rPr lang="en-US" i="1" dirty="0" smtClean="0"/>
-              <a:t>Block </a:t>
-            </a:r>
-            <a:r>
-              <a:rPr lang="en-US" i="1" dirty="0"/>
-              <a:t>of code to </a:t>
-            </a:r>
-            <a:r>
-              <a:rPr lang="en-US" i="1" dirty="0" smtClean="0"/>
-              <a:t>try execute. Throws an error object.</a:t>
-            </a:r>
-          </a:p>
-          <a:p>
-            <a:pPr>
-              <a:spcBef>
-                <a:spcPts val="0"/>
-              </a:spcBef>
+              <a:t>Prefer exceptions to error codes (e.g. -1, false, 0x3343…)</a:t>
+            </a:r>
+          </a:p>
+          <a:p>
+            <a:pPr marL="342900" indent="-342900">
+              <a:buFont typeface="Arial" panose="020B0604020202020204" pitchFamily="34" charset="0"/>
+              <a:buChar char="•"/>
             </a:pPr>
             <a:r>
               <a:rPr lang="en-US" dirty="0" smtClean="0"/>
-              <a:t>    throw </a:t>
-            </a:r>
-            <a:r>
-              <a:rPr lang="en-US" dirty="0"/>
-              <a:t>new Error(message, </a:t>
-            </a:r>
-            <a:r>
-              <a:rPr lang="en-US" dirty="0" err="1"/>
-              <a:t>fileName</a:t>
-            </a:r>
-            <a:r>
-              <a:rPr lang="en-US" dirty="0"/>
-              <a:t>, </a:t>
-            </a:r>
-            <a:r>
-              <a:rPr lang="en-US" dirty="0" err="1"/>
-              <a:t>lineNumber</a:t>
-            </a:r>
-            <a:r>
-              <a:rPr lang="en-US" dirty="0" smtClean="0"/>
-              <a:t>)</a:t>
-            </a:r>
-            <a:r>
-              <a:rPr lang="en-US" i="1" dirty="0"/>
-              <a:t/>
-            </a:r>
-            <a:br>
-              <a:rPr lang="en-US" i="1" dirty="0"/>
-            </a:br>
-            <a:r>
-              <a:rPr lang="en-US" dirty="0"/>
-              <a:t>}</a:t>
-            </a:r>
-            <a:br>
-              <a:rPr lang="en-US" dirty="0"/>
-            </a:br>
-            <a:r>
-              <a:rPr lang="en-US" dirty="0"/>
-              <a:t>catch(err) {</a:t>
-            </a:r>
-            <a:br>
-              <a:rPr lang="en-US" dirty="0"/>
-            </a:br>
-            <a:r>
-              <a:rPr lang="en-US" dirty="0"/>
-              <a:t>   </a:t>
-            </a:r>
-            <a:r>
-              <a:rPr lang="en-US" dirty="0" smtClean="0"/>
-              <a:t>// </a:t>
-            </a:r>
-            <a:r>
-              <a:rPr lang="en-US" i="1" dirty="0" smtClean="0"/>
-              <a:t>Block </a:t>
-            </a:r>
-            <a:r>
-              <a:rPr lang="en-US" i="1" dirty="0"/>
-              <a:t>of code to handle </a:t>
-            </a:r>
-            <a:r>
-              <a:rPr lang="en-US" i="1" dirty="0" smtClean="0"/>
-              <a:t>errors. Executes only if block in </a:t>
-            </a:r>
-            <a:r>
-              <a:rPr lang="en-US" b="1" i="1" dirty="0" smtClean="0"/>
-              <a:t>try</a:t>
-            </a:r>
-            <a:r>
-              <a:rPr lang="en-US" i="1" dirty="0" smtClean="0"/>
-              <a:t> </a:t>
-            </a:r>
-            <a:r>
-              <a:rPr lang="en-US" b="1" i="1" dirty="0" smtClean="0"/>
-              <a:t>throws</a:t>
-            </a:r>
-            <a:r>
-              <a:rPr lang="en-US" i="1" dirty="0" smtClean="0"/>
-              <a:t>.</a:t>
-            </a:r>
-            <a:r>
-              <a:rPr lang="en-US" i="1" dirty="0"/>
-              <a:t/>
-            </a:r>
-            <a:br>
-              <a:rPr lang="en-US" i="1" dirty="0"/>
-            </a:br>
-            <a:r>
-              <a:rPr lang="en-US" dirty="0" smtClean="0"/>
-              <a:t>}</a:t>
-            </a:r>
-          </a:p>
-          <a:p>
-            <a:pPr>
-              <a:spcBef>
-                <a:spcPts val="0"/>
-              </a:spcBef>
-            </a:pPr>
-            <a:r>
-              <a:rPr lang="en-US" dirty="0"/>
-              <a:t>finally {</a:t>
-            </a:r>
-          </a:p>
-          <a:p>
-            <a:pPr>
-              <a:spcBef>
-                <a:spcPts val="0"/>
-              </a:spcBef>
-            </a:pPr>
-            <a:r>
-              <a:rPr lang="en-US" i="1" dirty="0"/>
-              <a:t>    </a:t>
-            </a:r>
-            <a:r>
-              <a:rPr lang="en-US" i="1" dirty="0" smtClean="0"/>
-              <a:t>// Block </a:t>
-            </a:r>
-            <a:r>
-              <a:rPr lang="en-US" i="1" dirty="0"/>
-              <a:t>of code to be executed regardless of the </a:t>
-            </a:r>
-            <a:r>
-              <a:rPr lang="en-US" b="1" i="1" dirty="0" smtClean="0"/>
-              <a:t>try</a:t>
-            </a:r>
-            <a:r>
-              <a:rPr lang="en-US" i="1" dirty="0" smtClean="0"/>
-              <a:t>/</a:t>
-            </a:r>
-            <a:r>
-              <a:rPr lang="en-US" b="1" i="1" dirty="0" smtClean="0"/>
-              <a:t>catch</a:t>
-            </a:r>
-            <a:r>
-              <a:rPr lang="en-US" i="1" dirty="0" smtClean="0"/>
-              <a:t> </a:t>
-            </a:r>
-            <a:r>
-              <a:rPr lang="en-US" i="1" dirty="0"/>
-              <a:t>result</a:t>
-            </a:r>
-          </a:p>
-          <a:p>
-            <a:pPr>
-              <a:spcBef>
-                <a:spcPts val="0"/>
-              </a:spcBef>
-            </a:pPr>
-            <a:r>
-              <a:rPr lang="en-US" dirty="0" smtClean="0"/>
-              <a:t>}</a:t>
+              <a:t>Create own exception type</a:t>
             </a:r>
           </a:p>
         </p:txBody>
@@ -8697,6 +8622,29 @@
             <a:r>
               <a:rPr lang="en-US" dirty="0" smtClean="0"/>
               <a:t>14. August 2015</a:t>
+            </a:r>
+            <a:endParaRPr lang="en-US" dirty="0"/>
+          </a:p>
+        </p:txBody>
+      </p:sp>
+      <p:sp>
+        <p:nvSpPr>
+          <p:cNvPr id="6" name="Text Placeholder 5"/>
+          <p:cNvSpPr>
+            <a:spLocks noGrp="1"/>
+          </p:cNvSpPr>
+          <p:nvPr>
+            <p:ph type="body" sz="quarter" idx="13"/>
+          </p:nvPr>
+        </p:nvSpPr>
+        <p:spPr/>
+        <p:txBody>
+          <a:bodyPr/>
+          <a:lstStyle/>
+          <a:p>
+            <a:r>
+              <a:rPr lang="en-US" dirty="0" smtClean="0"/>
+              <a:t>Best practices</a:t>
             </a:r>
             <a:endParaRPr lang="en-US" dirty="0"/>
           </a:p>
@@ -8824,7 +8772,7 @@
           <a:p>
             <a:r>
               <a:rPr lang="en-US" dirty="0" smtClean="0"/>
-              <a:t>Exception handling</a:t>
+              <a:t>Scopes of variables</a:t>
             </a:r>
             <a:endParaRPr lang="en-US" dirty="0"/>
           </a:p>
@@ -8840,72 +8788,194 @@
             <p:ph idx="1"/>
           </p:nvPr>
         </p:nvSpPr>
-        <p:spPr/>
+        <p:spPr>
+          <a:xfrm>
+            <a:off x="539552" y="1052736"/>
+            <a:ext cx="8412161" cy="4776787"/>
+          </a:xfrm>
+        </p:spPr>
         <p:txBody>
           <a:bodyPr/>
           <a:lstStyle/>
           <a:p>
             <a:pPr marL="342900" indent="-342900">
+              <a:spcAft>
+                <a:spcPts val="1800"/>
+              </a:spcAft>
               <a:buFont typeface="Arial" panose="020B0604020202020204" pitchFamily="34" charset="0"/>
               <a:buChar char="•"/>
             </a:pPr>
             <a:r>
               <a:rPr lang="en-US" dirty="0" smtClean="0"/>
-              <a:t>Handle </a:t>
-            </a:r>
-            <a:r>
-              <a:rPr lang="en-US" b="1" dirty="0" smtClean="0"/>
-              <a:t>all</a:t>
-            </a:r>
-            <a:r>
-              <a:rPr lang="en-US" dirty="0" smtClean="0"/>
-              <a:t> exceptions that may occur and influence users workflow</a:t>
-            </a:r>
+              <a:t>Global scope is reachable everywhere.</a:t>
+            </a:r>
+          </a:p>
+          <a:p>
+            <a:pPr>
+              <a:spcBef>
+                <a:spcPts val="0"/>
+              </a:spcBef>
+            </a:pPr>
+            <a:r>
+              <a:rPr lang="en-US" dirty="0" err="1"/>
+              <a:t>var</a:t>
+            </a:r>
+            <a:r>
+              <a:rPr lang="en-US" dirty="0"/>
+              <a:t> a = 1</a:t>
+            </a:r>
+            <a:r>
+              <a:rPr lang="en-US" dirty="0" smtClean="0"/>
+              <a:t>;</a:t>
+            </a:r>
+          </a:p>
+          <a:p>
+            <a:pPr>
+              <a:spcBef>
+                <a:spcPts val="0"/>
+              </a:spcBef>
+            </a:pPr>
+            <a:endParaRPr lang="en-US" dirty="0"/>
+          </a:p>
+          <a:p>
+            <a:pPr>
+              <a:spcBef>
+                <a:spcPts val="0"/>
+              </a:spcBef>
+            </a:pPr>
+            <a:r>
+              <a:rPr lang="en-US" dirty="0" smtClean="0"/>
+              <a:t>function </a:t>
+            </a:r>
+            <a:r>
+              <a:rPr lang="en-US" dirty="0"/>
+              <a:t>one() {</a:t>
+            </a:r>
+          </a:p>
+          <a:p>
+            <a:pPr>
+              <a:spcBef>
+                <a:spcPts val="0"/>
+              </a:spcBef>
+            </a:pPr>
+            <a:r>
+              <a:rPr lang="en-US" dirty="0" smtClean="0"/>
+              <a:t>     console.log(a);</a:t>
+            </a:r>
+          </a:p>
+          <a:p>
+            <a:pPr>
+              <a:spcBef>
+                <a:spcPts val="0"/>
+              </a:spcBef>
+            </a:pPr>
+            <a:r>
+              <a:rPr lang="en-US" dirty="0" smtClean="0"/>
+              <a:t>     a++;</a:t>
+            </a:r>
+            <a:endParaRPr lang="en-US" dirty="0"/>
+          </a:p>
+          <a:p>
+            <a:pPr>
+              <a:spcBef>
+                <a:spcPts val="0"/>
+              </a:spcBef>
+            </a:pPr>
+            <a:r>
+              <a:rPr lang="en-US" dirty="0" smtClean="0"/>
+              <a:t>}</a:t>
+            </a:r>
+          </a:p>
+          <a:p>
+            <a:pPr>
+              <a:spcBef>
+                <a:spcPts val="0"/>
+              </a:spcBef>
+            </a:pPr>
+            <a:endParaRPr lang="en-US" dirty="0"/>
+          </a:p>
+          <a:p>
+            <a:pPr>
+              <a:spcBef>
+                <a:spcPts val="0"/>
+              </a:spcBef>
+            </a:pPr>
+            <a:r>
+              <a:rPr lang="en-US" dirty="0" smtClean="0"/>
+              <a:t>Function two() {</a:t>
+            </a:r>
+          </a:p>
+          <a:p>
+            <a:pPr>
+              <a:spcBef>
+                <a:spcPts val="0"/>
+              </a:spcBef>
+            </a:pPr>
+            <a:r>
+              <a:rPr lang="en-US" dirty="0" smtClean="0"/>
+              <a:t>    console.log(a);</a:t>
+            </a:r>
+          </a:p>
+          <a:p>
+            <a:pPr>
+              <a:spcBef>
+                <a:spcPts val="0"/>
+              </a:spcBef>
+            </a:pPr>
+            <a:r>
+              <a:rPr lang="en-US" dirty="0" smtClean="0"/>
+              <a:t>}</a:t>
+            </a:r>
+          </a:p>
+          <a:p>
+            <a:pPr>
+              <a:spcBef>
+                <a:spcPts val="0"/>
+              </a:spcBef>
+            </a:pPr>
+            <a:endParaRPr lang="en-US" dirty="0"/>
+          </a:p>
+          <a:p>
+            <a:pPr>
+              <a:spcBef>
+                <a:spcPts val="0"/>
+              </a:spcBef>
+            </a:pPr>
+            <a:r>
+              <a:rPr lang="en-US" dirty="0" smtClean="0"/>
+              <a:t>one(); // outputs 1</a:t>
+            </a:r>
+          </a:p>
+          <a:p>
+            <a:pPr>
+              <a:spcBef>
+                <a:spcPts val="0"/>
+              </a:spcBef>
+            </a:pPr>
+            <a:r>
+              <a:rPr lang="en-US" dirty="0" smtClean="0"/>
+              <a:t>two(); // outputs 2</a:t>
+            </a:r>
+          </a:p>
+          <a:p>
+            <a:pPr>
+              <a:spcBef>
+                <a:spcPts val="0"/>
+              </a:spcBef>
+            </a:pPr>
+            <a:endParaRPr lang="en-US" dirty="0"/>
           </a:p>
           <a:p>
             <a:pPr marL="342900" indent="-342900">
+              <a:spcBef>
+                <a:spcPts val="0"/>
+              </a:spcBef>
               <a:buFont typeface="Arial" panose="020B0604020202020204" pitchFamily="34" charset="0"/>
               <a:buChar char="•"/>
             </a:pPr>
             <a:r>
-              <a:rPr lang="en-US" dirty="0" smtClean="0"/>
-              <a:t>Do not use exceptions for non-exceptional </a:t>
-            </a:r>
-            <a:r>
-              <a:rPr lang="en-US" dirty="0"/>
-              <a:t>flow </a:t>
-            </a:r>
-            <a:r>
-              <a:rPr lang="en-US" dirty="0" smtClean="0"/>
-              <a:t>control</a:t>
-            </a:r>
-            <a:endParaRPr lang="en-US" dirty="0" smtClean="0"/>
-          </a:p>
-          <a:p>
-            <a:pPr marL="342900" indent="-342900">
-              <a:buFont typeface="Arial" panose="020B0604020202020204" pitchFamily="34" charset="0"/>
-              <a:buChar char="•"/>
-            </a:pPr>
-            <a:endParaRPr lang="en-US" dirty="0"/>
-          </a:p>
-          <a:p>
-            <a:pPr marL="342900" indent="-342900">
-              <a:buFont typeface="Arial" panose="020B0604020202020204" pitchFamily="34" charset="0"/>
-              <a:buChar char="•"/>
-            </a:pPr>
-            <a:r>
-              <a:rPr lang="en-US" dirty="0" smtClean="0"/>
-              <a:t>Prefer exceptions to error codes (e.g. -1, false, 0x3343…)</a:t>
-            </a:r>
-          </a:p>
-          <a:p>
-            <a:pPr marL="342900" indent="-342900">
-              <a:buFont typeface="Arial" panose="020B0604020202020204" pitchFamily="34" charset="0"/>
-              <a:buChar char="•"/>
-            </a:pPr>
-            <a:r>
-              <a:rPr lang="en-US" dirty="0" smtClean="0"/>
-              <a:t>Create own exception type</a:t>
+              <a:rPr lang="en-US" b="1" u="sng" dirty="0" smtClean="0"/>
+              <a:t>Try to avoid global scope completely!</a:t>
             </a:r>
           </a:p>
         </p:txBody>
@@ -8928,29 +8998,6 @@
             <a:r>
               <a:rPr lang="en-US" dirty="0" smtClean="0"/>
               <a:t>14. August 2015</a:t>
-            </a:r>
-            <a:endParaRPr lang="en-US" dirty="0"/>
-          </a:p>
-        </p:txBody>
-      </p:sp>
-      <p:sp>
-        <p:nvSpPr>
-          <p:cNvPr id="6" name="Text Placeholder 5"/>
-          <p:cNvSpPr>
-            <a:spLocks noGrp="1"/>
-          </p:cNvSpPr>
-          <p:nvPr>
-            <p:ph type="body" sz="quarter" idx="13"/>
-          </p:nvPr>
-        </p:nvSpPr>
-        <p:spPr/>
-        <p:txBody>
-          <a:bodyPr/>
-          <a:lstStyle/>
-          <a:p>
-            <a:r>
-              <a:rPr lang="en-US" dirty="0" smtClean="0"/>
-              <a:t>Best practices</a:t>
             </a:r>
             <a:endParaRPr lang="en-US" dirty="0"/>
           </a:p>
@@ -9077,10 +9124,9 @@
           <a:lstStyle/>
           <a:p>
             <a:r>
-              <a:rPr lang="en-US" dirty="0" smtClean="0"/>
+              <a:rPr lang="en-US" dirty="0"/>
               <a:t>Scopes of variables</a:t>
             </a:r>
-            <a:endParaRPr lang="en-US" dirty="0"/>
           </a:p>
         </p:txBody>
       </p:sp>
@@ -9094,12 +9140,7 @@
             <p:ph idx="1"/>
           </p:nvPr>
         </p:nvSpPr>
-        <p:spPr>
-          <a:xfrm>
-            <a:off x="539552" y="1052736"/>
-            <a:ext cx="8412161" cy="4776787"/>
-          </a:xfrm>
-        </p:spPr>
+        <p:spPr/>
         <p:txBody>
           <a:bodyPr/>
           <a:lstStyle/>
@@ -9113,7 +9154,55 @@
             </a:pPr>
             <a:r>
               <a:rPr lang="en-US" dirty="0" smtClean="0"/>
-              <a:t>Global scope is reachable everywhere.</a:t>
+              <a:t>Local scope is </a:t>
+            </a:r>
+            <a:r>
+              <a:rPr lang="en-US" dirty="0"/>
+              <a:t>reachable</a:t>
+            </a:r>
+            <a:r>
+              <a:rPr lang="en-US" dirty="0" smtClean="0"/>
+              <a:t> only </a:t>
+            </a:r>
+            <a:r>
+              <a:rPr lang="en-US" dirty="0"/>
+              <a:t>in a </a:t>
+            </a:r>
+            <a:r>
+              <a:rPr lang="en-US" dirty="0" smtClean="0"/>
+              <a:t>function (&amp; an object).</a:t>
+            </a:r>
+          </a:p>
+          <a:p>
+            <a:pPr marL="342900" indent="-342900">
+              <a:spcAft>
+                <a:spcPts val="1800"/>
+              </a:spcAft>
+              <a:buFont typeface="Arial" panose="020B0604020202020204" pitchFamily="34" charset="0"/>
+              <a:buChar char="•"/>
+            </a:pPr>
+            <a:r>
+              <a:rPr lang="en-US" dirty="0" smtClean="0"/>
+              <a:t>Hides a global variable if it has the same name.</a:t>
+            </a:r>
+          </a:p>
+          <a:p>
+            <a:pPr>
+              <a:spcAft>
+                <a:spcPts val="1800"/>
+              </a:spcAft>
+            </a:pPr>
+            <a:r>
+              <a:rPr lang="en-US" dirty="0" err="1"/>
+              <a:t>v</a:t>
+            </a:r>
+            <a:r>
+              <a:rPr lang="en-US" dirty="0" err="1" smtClean="0"/>
+              <a:t>ar</a:t>
+            </a:r>
+            <a:r>
+              <a:rPr lang="en-US" dirty="0" smtClean="0"/>
+              <a:t> a = 2;</a:t>
             </a:r>
           </a:p>
           <a:p>
@@ -9123,16 +9212,12 @@
               </a:spcBef>
             </a:pPr>
             <a:r>
-              <a:rPr lang="en-US" dirty="0" err="1"/>
-              <a:t>var</a:t>
+              <a:rPr lang="en-US" dirty="0" smtClean="0"/>
+              <a:t>function </a:t>
             </a:r>
             <a:r>
               <a:rPr lang="en-US" dirty="0"/>
-              <a:t> a = 1</a:t>
-            </a:r>
-            <a:r>
-              <a:rPr lang="en-US" dirty="0" smtClean="0"/>
-              <a:t>;</a:t>
+              <a:t>three() {</a:t>
             </a:r>
           </a:p>
           <a:p>
@@ -9141,7 +9226,18 @@
                 <a:spcPts val="0"/>
               </a:spcBef>
             </a:pPr>
-            <a:endParaRPr lang="en-US" dirty="0"/>
+            <a:r>
+              <a:rPr lang="en-US" dirty="0"/>
+              <a:t>  </a:t>
+            </a:r>
+            <a:r>
+              <a:rPr lang="en-US" dirty="0" err="1"/>
+              <a:t>var</a:t>
+            </a:r>
+            <a:r>
+              <a:rPr lang="en-US" dirty="0"/>
+              <a:t> a = 3;</a:t>
+            </a:r>
           </a:p>
           <a:p>
             <a:pPr>
@@ -9150,13 +9246,14 @@
               </a:spcBef>
             </a:pPr>
             <a:r>
-              <a:rPr lang="en-US" dirty="0" smtClean="0"/>
-              <a:t>function </a:t>
-            </a:r>
-            <a:r>
               <a:rPr lang="en-US" dirty="0"/>
-              <a:t>one() {</a:t>
-            </a:r>
+              <a:t>  alert(a</a:t>
+            </a:r>
+            <a:r>
+              <a:rPr lang="en-US" dirty="0" smtClean="0"/>
+              <a:t>); // outputs 3 always</a:t>
+            </a:r>
+            <a:endParaRPr lang="en-US" dirty="0"/>
           </a:p>
           <a:p>
             <a:pPr>
@@ -9165,8 +9262,8 @@
               </a:spcBef>
             </a:pPr>
             <a:r>
-              <a:rPr lang="en-US" dirty="0" smtClean="0"/>
-              <a:t>     console.log(a);</a:t>
+              <a:rPr lang="en-US" dirty="0"/>
+              <a:t>}</a:t>
             </a:r>
           </a:p>
           <a:p>
@@ -9175,93 +9272,7 @@
                 <a:spcPts val="0"/>
               </a:spcBef>
             </a:pPr>
-            <a:r>
-              <a:rPr lang="en-US" dirty="0" smtClean="0"/>
-              <a:t>     a++;</a:t>
-            </a:r>
-            <a:endParaRPr lang="en-US" dirty="0"/>
-          </a:p>
-          <a:p>
-            <a:pPr>
-              <a:spcBef>
-                <a:spcPts val="0"/>
-              </a:spcBef>
-            </a:pPr>
-            <a:r>
-              <a:rPr lang="en-US" dirty="0" smtClean="0"/>
-              <a:t>}</a:t>
-            </a:r>
-          </a:p>
-          <a:p>
-            <a:pPr>
-              <a:spcBef>
-                <a:spcPts val="0"/>
-              </a:spcBef>
-            </a:pPr>
-            <a:endParaRPr lang="en-US" dirty="0"/>
-          </a:p>
-          <a:p>
-            <a:pPr>
-              <a:spcBef>
-                <a:spcPts val="0"/>
-              </a:spcBef>
-            </a:pPr>
-            <a:r>
-              <a:rPr lang="en-US" dirty="0" smtClean="0"/>
-              <a:t>Function two() {</a:t>
-            </a:r>
-          </a:p>
-          <a:p>
-            <a:pPr>
-              <a:spcBef>
-                <a:spcPts val="0"/>
-              </a:spcBef>
-            </a:pPr>
-            <a:r>
-              <a:rPr lang="en-US" dirty="0" smtClean="0"/>
-              <a:t>    console.log(a);</a:t>
-            </a:r>
-          </a:p>
-          <a:p>
-            <a:pPr>
-              <a:spcBef>
-                <a:spcPts val="0"/>
-              </a:spcBef>
-            </a:pPr>
-            <a:r>
-              <a:rPr lang="en-US" dirty="0" smtClean="0"/>
-              <a:t>}</a:t>
-            </a:r>
-          </a:p>
-          <a:p>
-            <a:pPr>
-              <a:spcBef>
-                <a:spcPts val="0"/>
-              </a:spcBef>
-            </a:pPr>
-            <a:endParaRPr lang="en-US" dirty="0"/>
-          </a:p>
-          <a:p>
-            <a:pPr>
-              <a:spcBef>
-                <a:spcPts val="0"/>
-              </a:spcBef>
-            </a:pPr>
-            <a:r>
-              <a:rPr lang="en-US" dirty="0" smtClean="0"/>
-              <a:t>one(); // outputs 1</a:t>
-            </a:r>
-          </a:p>
-          <a:p>
-            <a:pPr>
-              <a:spcBef>
-                <a:spcPts val="0"/>
-              </a:spcBef>
-            </a:pPr>
-            <a:r>
-              <a:rPr lang="en-US" dirty="0" smtClean="0"/>
-              <a:t>two(); // outputs 2</a:t>
-            </a:r>
+            <a:endParaRPr lang="en-US" dirty="0" smtClean="0"/>
           </a:p>
           <a:p>
             <a:pPr>
@@ -9280,9 +9291,55 @@
               <a:buChar char="•"/>
             </a:pPr>
             <a:r>
-              <a:rPr lang="en-US" b="1" u="sng" dirty="0" smtClean="0"/>
-              <a:t>Try to avoid global scope completely!</a:t>
-            </a:r>
+              <a:rPr lang="en-US" b="1" dirty="0"/>
+              <a:t>Careful</a:t>
+            </a:r>
+            <a:r>
+              <a:rPr lang="en-US" dirty="0"/>
+              <a:t>: </a:t>
+            </a:r>
+            <a:r>
+              <a:rPr lang="en-US" dirty="0" smtClean="0"/>
+              <a:t>There are no new scopes </a:t>
+            </a:r>
+            <a:r>
+              <a:rPr lang="en-US" dirty="0"/>
+              <a:t>for blocks of </a:t>
+            </a:r>
+            <a:r>
+              <a:rPr lang="en-US" b="1" dirty="0"/>
+              <a:t>if</a:t>
+            </a:r>
+            <a:r>
+              <a:rPr lang="en-US" dirty="0"/>
+              <a:t>,</a:t>
+            </a:r>
+            <a:r>
+              <a:rPr lang="en-US" b="1" dirty="0"/>
+              <a:t> for</a:t>
+            </a:r>
+            <a:r>
+              <a:rPr lang="en-US" dirty="0"/>
+              <a:t>,</a:t>
+            </a:r>
+            <a:r>
+              <a:rPr lang="en-US" b="1" dirty="0"/>
+              <a:t> </a:t>
+            </a:r>
+            <a:r>
+              <a:rPr lang="en-US" b="1" dirty="0" smtClean="0"/>
+              <a:t>while, switch…</a:t>
+            </a:r>
+          </a:p>
+          <a:p>
+            <a:pPr marL="342900" indent="-342900">
+              <a:spcBef>
+                <a:spcPts val="0"/>
+              </a:spcBef>
+              <a:buFont typeface="Arial" panose="020B0604020202020204" pitchFamily="34" charset="0"/>
+              <a:buChar char="•"/>
+            </a:pPr>
+            <a:endParaRPr lang="en-US" b="1" dirty="0" smtClean="0"/>
           </a:p>
         </p:txBody>
       </p:sp>
@@ -9302,16 +9359,16 @@
           <a:lstStyle/>
           <a:p>
             <a:r>
-              <a:rPr lang="en-US" dirty="0" smtClean="0"/>
+              <a:rPr lang="de-CH" smtClean="0"/>
               <a:t>14. August 2015</a:t>
             </a:r>
-            <a:endParaRPr lang="en-US" dirty="0"/>
-          </a:p>
-        </p:txBody>
-      </p:sp>
-      <p:sp>
-        <p:nvSpPr>
-          <p:cNvPr id="7" name="Footer Placeholder 6"/>
+            <a:endParaRPr lang="de-CH" dirty="0"/>
+          </a:p>
+        </p:txBody>
+      </p:sp>
+      <p:sp>
+        <p:nvSpPr>
+          <p:cNvPr id="5" name="Footer Placeholder 4"/>
           <p:cNvSpPr>
             <a:spLocks noGrp="1"/>
           </p:cNvSpPr>
@@ -9325,40 +9382,35 @@
           <a:lstStyle/>
           <a:p>
             <a:r>
-              <a:rPr lang="en-US" dirty="0" err="1" smtClean="0"/>
-              <a:t>Javascript</a:t>
-            </a:r>
-            <a:r>
-              <a:rPr lang="en-US" dirty="0" smtClean="0"/>
-              <a:t> Basics | </a:t>
-            </a:r>
-            <a:r>
-              <a:rPr lang="en-US" dirty="0" err="1" smtClean="0"/>
-              <a:t>nesp</a:t>
-            </a:r>
-            <a:r>
-              <a:rPr lang="en-US" dirty="0" smtClean="0"/>
-              <a:t>, </a:t>
-            </a:r>
-            <a:r>
-              <a:rPr lang="en-US" dirty="0" err="1" smtClean="0"/>
-              <a:t>stmi</a:t>
-            </a:r>
-            <a:r>
-              <a:rPr lang="en-US" dirty="0" smtClean="0"/>
-              <a:t>, </a:t>
-            </a:r>
-            <a:r>
-              <a:rPr lang="en-US" dirty="0" err="1" smtClean="0"/>
-              <a:t>mabo</a:t>
-            </a:r>
-            <a:endParaRPr lang="en-US" dirty="0"/>
-          </a:p>
-        </p:txBody>
-      </p:sp>
-      <p:sp>
-        <p:nvSpPr>
-          <p:cNvPr id="9" name="Slide Number Placeholder 8"/>
+              <a:rPr lang="de-CH" smtClean="0"/>
+              <a:t>Javascript Basics | nesp, stmi, mabo</a:t>
+            </a:r>
+            <a:endParaRPr lang="de-CH" dirty="0"/>
+          </a:p>
+        </p:txBody>
+      </p:sp>
+      <p:sp>
+        <p:nvSpPr>
+          <p:cNvPr id="7" name="Text Placeholder 6"/>
+          <p:cNvSpPr>
+            <a:spLocks noGrp="1"/>
+          </p:cNvSpPr>
+          <p:nvPr>
+            <p:ph type="body" sz="quarter" idx="13"/>
+          </p:nvPr>
+        </p:nvSpPr>
+        <p:spPr/>
+        <p:txBody>
+          <a:bodyPr/>
+          <a:lstStyle/>
+          <a:p>
+            <a:endParaRPr lang="en-US"/>
+          </a:p>
+        </p:txBody>
+      </p:sp>
+      <p:sp>
+        <p:nvSpPr>
+          <p:cNvPr id="8" name="Slide Number Placeholder 7"/>
           <p:cNvSpPr>
             <a:spLocks noGrp="1"/>
           </p:cNvSpPr>
@@ -9387,7 +9439,7 @@
     </p:spTree>
     <p:extLst>
       <p:ext uri="{BB962C8B-B14F-4D97-AF65-F5344CB8AC3E}">
-        <p14:creationId xmlns:p14="http://schemas.microsoft.com/office/powerpoint/2010/main" val="2884851122"/>
+        <p14:creationId xmlns:p14="http://schemas.microsoft.com/office/powerpoint/2010/main" val="3322228320"/>
       </p:ext>
     </p:extLst>
   </p:cSld>
@@ -9430,9 +9482,10 @@
           <a:lstStyle/>
           <a:p>
             <a:r>
-              <a:rPr lang="en-US" dirty="0"/>
-              <a:t>Scopes of variables</a:t>
-            </a:r>
+              <a:rPr lang="en-US" dirty="0" smtClean="0"/>
+              <a:t>Lifetime of scopes</a:t>
+            </a:r>
+            <a:endParaRPr lang="en-US" dirty="0"/>
           </a:p>
         </p:txBody>
       </p:sp>
@@ -9452,200 +9505,112 @@
           <a:lstStyle/>
           <a:p>
             <a:pPr marL="342900" indent="-342900">
-              <a:spcAft>
-                <a:spcPts val="1800"/>
-              </a:spcAft>
               <a:buFont typeface="Arial" panose="020B0604020202020204" pitchFamily="34" charset="0"/>
               <a:buChar char="•"/>
             </a:pPr>
             <a:r>
-              <a:rPr lang="en-US" dirty="0" smtClean="0"/>
-              <a:t>Local scope is </a:t>
-            </a:r>
-            <a:r>
               <a:rPr lang="en-US" dirty="0"/>
-              <a:t>reachable</a:t>
-            </a:r>
-            <a:r>
-              <a:rPr lang="en-US" dirty="0" smtClean="0"/>
-              <a:t> only </a:t>
-            </a:r>
-            <a:r>
-              <a:rPr lang="en-US" dirty="0"/>
-              <a:t>in a </a:t>
-            </a:r>
-            <a:r>
-              <a:rPr lang="en-US" dirty="0" smtClean="0"/>
-              <a:t>function (&amp; an object).</a:t>
+              <a:t>Local variables are deleted when the function is completed</a:t>
+            </a:r>
+            <a:r>
+              <a:rPr lang="en-US" dirty="0" smtClean="0"/>
+              <a:t>.</a:t>
             </a:r>
           </a:p>
           <a:p>
             <a:pPr marL="342900" indent="-342900">
-              <a:spcAft>
-                <a:spcPts val="1800"/>
-              </a:spcAft>
               <a:buFont typeface="Arial" panose="020B0604020202020204" pitchFamily="34" charset="0"/>
               <a:buChar char="•"/>
             </a:pPr>
             <a:r>
-              <a:rPr lang="en-US" dirty="0" smtClean="0"/>
-              <a:t>Hides a global variable if it has the same name.</a:t>
-            </a:r>
-          </a:p>
-          <a:p>
-            <a:pPr>
-              <a:spcAft>
-                <a:spcPts val="1800"/>
-              </a:spcAft>
-            </a:pPr>
-            <a:r>
-              <a:rPr lang="en-US" dirty="0" err="1"/>
-              <a:t>v</a:t>
-            </a:r>
-            <a:r>
-              <a:rPr lang="en-US" dirty="0" err="1" smtClean="0"/>
-              <a:t>ar</a:t>
-            </a:r>
-            <a:r>
-              <a:rPr lang="en-US" dirty="0" smtClean="0"/>
-              <a:t> a = 2;</a:t>
-            </a:r>
-          </a:p>
-          <a:p>
-            <a:pPr>
-              <a:spcBef>
-                <a:spcPts val="0"/>
-              </a:spcBef>
-            </a:pPr>
-            <a:r>
-              <a:rPr lang="en-US" dirty="0" smtClean="0"/>
-              <a:t>function </a:t>
-            </a:r>
-            <a:r>
               <a:rPr lang="en-US" dirty="0"/>
-              <a:t>three() {</a:t>
-            </a:r>
-          </a:p>
-          <a:p>
-            <a:pPr>
-              <a:spcBef>
-                <a:spcPts val="0"/>
-              </a:spcBef>
-            </a:pPr>
-            <a:r>
-              <a:rPr lang="en-US" dirty="0"/>
-              <a:t>  </a:t>
-            </a:r>
-            <a:r>
-              <a:rPr lang="en-US" dirty="0" err="1"/>
-              <a:t>var</a:t>
-            </a:r>
-            <a:r>
-              <a:rPr lang="en-US" dirty="0"/>
-              <a:t> a = 3;</a:t>
-            </a:r>
-          </a:p>
-          <a:p>
-            <a:pPr>
-              <a:spcBef>
-                <a:spcPts val="0"/>
-              </a:spcBef>
-            </a:pPr>
-            <a:r>
-              <a:rPr lang="en-US" dirty="0"/>
-              <a:t>  alert(a</a:t>
-            </a:r>
-            <a:r>
-              <a:rPr lang="en-US" dirty="0" smtClean="0"/>
-              <a:t>); // outputs 3 always</a:t>
-            </a:r>
-            <a:endParaRPr lang="en-US" dirty="0"/>
-          </a:p>
-          <a:p>
-            <a:pPr>
-              <a:spcBef>
-                <a:spcPts val="0"/>
-              </a:spcBef>
-            </a:pPr>
-            <a:r>
-              <a:rPr lang="en-US" dirty="0"/>
-              <a:t>}</a:t>
-            </a:r>
-          </a:p>
-          <a:p>
-            <a:pPr>
-              <a:spcBef>
-                <a:spcPts val="0"/>
-              </a:spcBef>
-            </a:pPr>
-            <a:endParaRPr lang="en-US" dirty="0" smtClean="0"/>
-          </a:p>
-          <a:p>
-            <a:pPr>
-              <a:spcBef>
-                <a:spcPts val="0"/>
-              </a:spcBef>
-            </a:pPr>
-            <a:endParaRPr lang="en-US" dirty="0"/>
+              <a:t>Global variables are deleted when you close the page</a:t>
+            </a:r>
+            <a:r>
+              <a:rPr lang="en-US" dirty="0" smtClean="0"/>
+              <a:t>.</a:t>
+            </a:r>
           </a:p>
           <a:p>
             <a:pPr marL="342900" indent="-342900">
-              <a:spcBef>
-                <a:spcPts val="0"/>
-              </a:spcBef>
               <a:buFont typeface="Arial" panose="020B0604020202020204" pitchFamily="34" charset="0"/>
               <a:buChar char="•"/>
             </a:pPr>
-            <a:r>
-              <a:rPr lang="en-US" b="1" dirty="0"/>
-              <a:t>Careful</a:t>
-            </a:r>
-            <a:r>
-              <a:rPr lang="en-US" dirty="0"/>
-              <a:t>: </a:t>
-            </a:r>
-            <a:r>
-              <a:rPr lang="en-US" dirty="0" smtClean="0"/>
-              <a:t>There are no new scopes </a:t>
-            </a:r>
-            <a:r>
-              <a:rPr lang="en-US" dirty="0"/>
-              <a:t>for blocks of </a:t>
-            </a:r>
-            <a:r>
-              <a:rPr lang="en-US" b="1" dirty="0"/>
-              <a:t>if</a:t>
-            </a:r>
-            <a:r>
-              <a:rPr lang="en-US" dirty="0"/>
-              <a:t>,</a:t>
-            </a:r>
-            <a:r>
-              <a:rPr lang="en-US" b="1" dirty="0"/>
-              <a:t> for</a:t>
-            </a:r>
-            <a:r>
-              <a:rPr lang="en-US" dirty="0"/>
-              <a:t>,</a:t>
-            </a:r>
-            <a:r>
-              <a:rPr lang="en-US" b="1" dirty="0"/>
-              <a:t> </a:t>
-            </a:r>
-            <a:r>
-              <a:rPr lang="en-US" b="1" dirty="0" smtClean="0"/>
-              <a:t>while, switch…</a:t>
-            </a:r>
+            <a:endParaRPr lang="en-US" dirty="0"/>
           </a:p>
           <a:p>
             <a:pPr marL="342900" indent="-342900">
-              <a:spcBef>
-                <a:spcPts val="0"/>
-              </a:spcBef>
               <a:buFont typeface="Arial" panose="020B0604020202020204" pitchFamily="34" charset="0"/>
               <a:buChar char="•"/>
             </a:pPr>
-            <a:endParaRPr lang="en-US" b="1" dirty="0" smtClean="0"/>
+            <a:r>
+              <a:rPr lang="en-US" b="1" dirty="0" smtClean="0"/>
+              <a:t>Beware</a:t>
+            </a:r>
+            <a:r>
+              <a:rPr lang="en-US" b="1" dirty="0"/>
+              <a:t> </a:t>
+            </a:r>
+            <a:r>
+              <a:rPr lang="en-US" b="1" dirty="0" smtClean="0"/>
+              <a:t>of automatically global scopes.</a:t>
+            </a:r>
+          </a:p>
+          <a:p>
+            <a:pPr marL="342900" indent="-342900">
+              <a:buFont typeface="Arial" panose="020B0604020202020204" pitchFamily="34" charset="0"/>
+              <a:buChar char="•"/>
+            </a:pPr>
+            <a:endParaRPr lang="en-US" b="1" dirty="0"/>
+          </a:p>
+          <a:p>
+            <a:r>
+              <a:rPr lang="en-GB" dirty="0"/>
+              <a:t>function </a:t>
+            </a:r>
+            <a:r>
+              <a:rPr lang="en-GB" dirty="0" err="1"/>
+              <a:t>myFunction</a:t>
+            </a:r>
+            <a:r>
+              <a:rPr lang="en-GB" dirty="0"/>
+              <a:t>() {</a:t>
+            </a:r>
+            <a:br>
+              <a:rPr lang="en-GB" dirty="0"/>
+            </a:br>
+            <a:r>
+              <a:rPr lang="en-GB" dirty="0"/>
+              <a:t>    </a:t>
+            </a:r>
+            <a:r>
+              <a:rPr lang="en-GB" dirty="0" err="1"/>
+              <a:t>carName</a:t>
+            </a:r>
+            <a:r>
+              <a:rPr lang="en-GB" dirty="0"/>
+              <a:t> = "Volvo</a:t>
+            </a:r>
+            <a:r>
+              <a:rPr lang="en-GB" dirty="0" smtClean="0"/>
+              <a:t>"; // will be declared globally if no </a:t>
+            </a:r>
+            <a:r>
+              <a:rPr lang="en-GB" b="1" dirty="0" err="1" smtClean="0"/>
+              <a:t>var</a:t>
+            </a:r>
+            <a:r>
+              <a:rPr lang="en-GB" dirty="0"/>
+              <a:t/>
+            </a:r>
+            <a:br>
+              <a:rPr lang="en-GB" dirty="0"/>
+            </a:br>
+            <a:r>
+              <a:rPr lang="en-GB" dirty="0"/>
+              <a:t>}</a:t>
+            </a:r>
+            <a:endParaRPr lang="en-US" b="1" dirty="0"/>
           </a:p>
         </p:txBody>
       </p:sp>
@@ -9665,16 +9630,35 @@
           <a:lstStyle/>
           <a:p>
             <a:r>
-              <a:rPr lang="de-CH" smtClean="0"/>
+              <a:rPr lang="en-US" dirty="0" smtClean="0"/>
               <a:t>14. August 2015</a:t>
             </a:r>
-            <a:endParaRPr lang="de-CH" dirty="0"/>
-          </a:p>
-        </p:txBody>
-      </p:sp>
-      <p:sp>
-        <p:nvSpPr>
-          <p:cNvPr id="5" name="Footer Placeholder 4"/>
+            <a:endParaRPr lang="en-US" dirty="0"/>
+          </a:p>
+        </p:txBody>
+      </p:sp>
+      <p:sp>
+        <p:nvSpPr>
+          <p:cNvPr id="6" name="Text Placeholder 5"/>
+          <p:cNvSpPr>
+            <a:spLocks noGrp="1"/>
+          </p:cNvSpPr>
+          <p:nvPr>
+            <p:ph type="body" sz="quarter" idx="13"/>
+          </p:nvPr>
+        </p:nvSpPr>
+        <p:spPr/>
+        <p:txBody>
+          <a:bodyPr/>
+          <a:lstStyle/>
+          <a:p>
+            <a:endParaRPr lang="en-US" dirty="0"/>
+          </a:p>
+        </p:txBody>
+      </p:sp>
+      <p:sp>
+        <p:nvSpPr>
+          <p:cNvPr id="7" name="Footer Placeholder 6"/>
           <p:cNvSpPr>
             <a:spLocks noGrp="1"/>
           </p:cNvSpPr>
@@ -9688,35 +9672,40 @@
           <a:lstStyle/>
           <a:p>
             <a:r>
-              <a:rPr lang="de-CH" smtClean="0"/>
-              <a:t>Javascript Basics | nesp, stmi, mabo</a:t>
-            </a:r>
-            <a:endParaRPr lang="de-CH" dirty="0"/>
-          </a:p>
-        </p:txBody>
-      </p:sp>
-      <p:sp>
-        <p:nvSpPr>
-          <p:cNvPr id="7" name="Text Placeholder 6"/>
-          <p:cNvSpPr>
-            <a:spLocks noGrp="1"/>
-          </p:cNvSpPr>
-          <p:nvPr>
-            <p:ph type="body" sz="quarter" idx="13"/>
-          </p:nvPr>
-        </p:nvSpPr>
-        <p:spPr/>
-        <p:txBody>
-          <a:bodyPr/>
-          <a:lstStyle/>
-          <a:p>
-            <a:endParaRPr lang="en-US"/>
-          </a:p>
-        </p:txBody>
-      </p:sp>
-      <p:sp>
-        <p:nvSpPr>
-          <p:cNvPr id="8" name="Slide Number Placeholder 7"/>
+              <a:rPr lang="en-US" dirty="0" err="1" smtClean="0"/>
+              <a:t>Javascript</a:t>
+            </a:r>
+            <a:r>
+              <a:rPr lang="en-US" dirty="0" smtClean="0"/>
+              <a:t> Basics | </a:t>
+            </a:r>
+            <a:r>
+              <a:rPr lang="en-US" dirty="0" err="1" smtClean="0"/>
+              <a:t>nesp</a:t>
+            </a:r>
+            <a:r>
+              <a:rPr lang="en-US" dirty="0" smtClean="0"/>
+              <a:t>, </a:t>
+            </a:r>
+            <a:r>
+              <a:rPr lang="en-US" dirty="0" err="1" smtClean="0"/>
+              <a:t>stmi</a:t>
+            </a:r>
+            <a:r>
+              <a:rPr lang="en-US" dirty="0" smtClean="0"/>
+              <a:t>, </a:t>
+            </a:r>
+            <a:r>
+              <a:rPr lang="en-US" dirty="0" err="1" smtClean="0"/>
+              <a:t>mabo</a:t>
+            </a:r>
+            <a:endParaRPr lang="en-US" dirty="0"/>
+          </a:p>
+        </p:txBody>
+      </p:sp>
+      <p:sp>
+        <p:nvSpPr>
+          <p:cNvPr id="9" name="Slide Number Placeholder 8"/>
           <p:cNvSpPr>
             <a:spLocks noGrp="1"/>
           </p:cNvSpPr>
@@ -9745,7 +9734,7 @@
     </p:spTree>
     <p:extLst>
       <p:ext uri="{BB962C8B-B14F-4D97-AF65-F5344CB8AC3E}">
-        <p14:creationId xmlns:p14="http://schemas.microsoft.com/office/powerpoint/2010/main" val="3322228320"/>
+        <p14:creationId xmlns:p14="http://schemas.microsoft.com/office/powerpoint/2010/main" val="2884851122"/>
       </p:ext>
     </p:extLst>
   </p:cSld>
@@ -10086,301 +10075,6 @@
           <a:lstStyle/>
           <a:p>
             <a:r>
-              <a:rPr lang="en-US" dirty="0" smtClean="0"/>
-              <a:t>Lifetime of scopes</a:t>
-            </a:r>
-            <a:endParaRPr lang="en-US" dirty="0"/>
-          </a:p>
-        </p:txBody>
-      </p:sp>
-      <p:sp>
-        <p:nvSpPr>
-          <p:cNvPr id="3" name="Content Placeholder 2"/>
-          <p:cNvSpPr>
-            <a:spLocks noGrp="1"/>
-          </p:cNvSpPr>
-          <p:nvPr>
-            <p:ph idx="1"/>
-          </p:nvPr>
-        </p:nvSpPr>
-        <p:spPr/>
-        <p:txBody>
-          <a:bodyPr/>
-          <a:lstStyle/>
-          <a:p>
-            <a:pPr marL="342900" indent="-342900">
-              <a:buFont typeface="Arial" panose="020B0604020202020204" pitchFamily="34" charset="0"/>
-              <a:buChar char="•"/>
-            </a:pPr>
-            <a:r>
-              <a:rPr lang="en-US" dirty="0"/>
-              <a:t>Local variables are deleted when the function is completed</a:t>
-            </a:r>
-            <a:r>
-              <a:rPr lang="en-US" dirty="0" smtClean="0"/>
-              <a:t>.</a:t>
-            </a:r>
-          </a:p>
-          <a:p>
-            <a:pPr marL="342900" indent="-342900">
-              <a:buFont typeface="Arial" panose="020B0604020202020204" pitchFamily="34" charset="0"/>
-              <a:buChar char="•"/>
-            </a:pPr>
-            <a:r>
-              <a:rPr lang="en-US" dirty="0"/>
-              <a:t>Global variables are deleted when you close the page</a:t>
-            </a:r>
-            <a:r>
-              <a:rPr lang="en-US" dirty="0" smtClean="0"/>
-              <a:t>.</a:t>
-            </a:r>
-          </a:p>
-          <a:p>
-            <a:pPr marL="342900" indent="-342900">
-              <a:buFont typeface="Arial" panose="020B0604020202020204" pitchFamily="34" charset="0"/>
-              <a:buChar char="•"/>
-            </a:pPr>
-            <a:endParaRPr lang="en-US" dirty="0"/>
-          </a:p>
-          <a:p>
-            <a:pPr marL="342900" indent="-342900">
-              <a:buFont typeface="Arial" panose="020B0604020202020204" pitchFamily="34" charset="0"/>
-              <a:buChar char="•"/>
-            </a:pPr>
-            <a:r>
-              <a:rPr lang="en-US" b="1" dirty="0" smtClean="0"/>
-              <a:t>Beware</a:t>
-            </a:r>
-            <a:r>
-              <a:rPr lang="en-US" b="1" dirty="0"/>
-              <a:t> </a:t>
-            </a:r>
-            <a:r>
-              <a:rPr lang="en-US" b="1" dirty="0" smtClean="0"/>
-              <a:t>of automatically global scopes.</a:t>
-            </a:r>
-          </a:p>
-          <a:p>
-            <a:pPr marL="342900" indent="-342900">
-              <a:buFont typeface="Arial" panose="020B0604020202020204" pitchFamily="34" charset="0"/>
-              <a:buChar char="•"/>
-            </a:pPr>
-            <a:endParaRPr lang="en-US" b="1" dirty="0"/>
-          </a:p>
-          <a:p>
-            <a:r>
-              <a:rPr lang="en-GB" dirty="0"/>
-              <a:t>function </a:t>
-            </a:r>
-            <a:r>
-              <a:rPr lang="en-GB" dirty="0" err="1"/>
-              <a:t>myFunction</a:t>
-            </a:r>
-            <a:r>
-              <a:rPr lang="en-GB" dirty="0"/>
-              <a:t>() {</a:t>
-            </a:r>
-            <a:br>
-              <a:rPr lang="en-GB" dirty="0"/>
-            </a:br>
-            <a:r>
-              <a:rPr lang="en-GB" dirty="0"/>
-              <a:t>    </a:t>
-            </a:r>
-            <a:r>
-              <a:rPr lang="en-GB" dirty="0" err="1"/>
-              <a:t>carName</a:t>
-            </a:r>
-            <a:r>
-              <a:rPr lang="en-GB" dirty="0"/>
-              <a:t> = "Volvo</a:t>
-            </a:r>
-            <a:r>
-              <a:rPr lang="en-GB" dirty="0" smtClean="0"/>
-              <a:t>"; // will be declared globally if no </a:t>
-            </a:r>
-            <a:r>
-              <a:rPr lang="en-GB" b="1" dirty="0" err="1" smtClean="0"/>
-              <a:t>var</a:t>
-            </a:r>
-            <a:r>
-              <a:rPr lang="en-GB" dirty="0"/>
-              <a:t/>
-            </a:r>
-            <a:br>
-              <a:rPr lang="en-GB" dirty="0"/>
-            </a:br>
-            <a:r>
-              <a:rPr lang="en-GB" dirty="0"/>
-              <a:t>}</a:t>
-            </a:r>
-            <a:endParaRPr lang="en-US" b="1" dirty="0"/>
-          </a:p>
-        </p:txBody>
-      </p:sp>
-      <p:sp>
-        <p:nvSpPr>
-          <p:cNvPr id="4" name="Date Placeholder 3"/>
-          <p:cNvSpPr>
-            <a:spLocks noGrp="1"/>
-          </p:cNvSpPr>
-          <p:nvPr>
-            <p:ph type="dt" sz="half" idx="10"/>
-          </p:nvPr>
-        </p:nvSpPr>
-        <p:spPr/>
-        <p:txBody>
-          <a:bodyPr/>
-          <a:lstStyle/>
-          <a:p>
-            <a:r>
-              <a:rPr lang="en-US" dirty="0" smtClean="0"/>
-              <a:t>14. August 2015</a:t>
-            </a:r>
-            <a:endParaRPr lang="en-US" dirty="0"/>
-          </a:p>
-        </p:txBody>
-      </p:sp>
-      <p:sp>
-        <p:nvSpPr>
-          <p:cNvPr id="6" name="Text Placeholder 5"/>
-          <p:cNvSpPr>
-            <a:spLocks noGrp="1"/>
-          </p:cNvSpPr>
-          <p:nvPr>
-            <p:ph type="body" sz="quarter" idx="13"/>
-          </p:nvPr>
-        </p:nvSpPr>
-        <p:spPr/>
-        <p:txBody>
-          <a:bodyPr/>
-          <a:lstStyle/>
-          <a:p>
-            <a:endParaRPr lang="en-US" dirty="0"/>
-          </a:p>
-        </p:txBody>
-      </p:sp>
-      <p:sp>
-        <p:nvSpPr>
-          <p:cNvPr id="7" name="Footer Placeholder 6"/>
-          <p:cNvSpPr>
-            <a:spLocks noGrp="1"/>
-          </p:cNvSpPr>
-          <p:nvPr>
-            <p:ph type="ftr" sz="quarter" idx="11"/>
-          </p:nvPr>
-        </p:nvSpPr>
-        <p:spPr/>
-        <p:txBody>
-          <a:bodyPr/>
-          <a:lstStyle/>
-          <a:p>
-            <a:r>
-              <a:rPr lang="en-US" dirty="0" err="1" smtClean="0"/>
-              <a:t>Javascript</a:t>
-            </a:r>
-            <a:r>
-              <a:rPr lang="en-US" dirty="0" smtClean="0"/>
-              <a:t> Basics | </a:t>
-            </a:r>
-            <a:r>
-              <a:rPr lang="en-US" dirty="0" err="1" smtClean="0"/>
-              <a:t>nesp</a:t>
-            </a:r>
-            <a:r>
-              <a:rPr lang="en-US" dirty="0" smtClean="0"/>
-              <a:t>, </a:t>
-            </a:r>
-            <a:r>
-              <a:rPr lang="en-US" dirty="0" err="1" smtClean="0"/>
-              <a:t>stmi</a:t>
-            </a:r>
-            <a:r>
-              <a:rPr lang="en-US" dirty="0" smtClean="0"/>
-              <a:t>, </a:t>
-            </a:r>
-            <a:r>
-              <a:rPr lang="en-US" dirty="0" err="1" smtClean="0"/>
-              <a:t>mabo</a:t>
-            </a:r>
-            <a:endParaRPr lang="en-US" dirty="0"/>
-          </a:p>
-        </p:txBody>
-      </p:sp>
-      <p:sp>
-        <p:nvSpPr>
-          <p:cNvPr id="9" name="Slide Number Placeholder 8"/>
-          <p:cNvSpPr>
-            <a:spLocks noGrp="1"/>
-          </p:cNvSpPr>
-          <p:nvPr>
-            <p:ph type="sldNum" sz="quarter" idx="12"/>
-          </p:nvPr>
-        </p:nvSpPr>
-        <p:spPr/>
-        <p:txBody>
-          <a:bodyPr/>
-          <a:lstStyle/>
-          <a:p>
-            <a:r>
-              <a:rPr lang="en-GB" smtClean="0"/>
-              <a:t>Slide </a:t>
-            </a:r>
-            <a:fld id="{B945A87F-2CE4-4B6D-B6BF-F6BF6C5CB292}" type="slidenum">
-              <a:rPr smtClean="0"/>
-              <a:pPr/>
-              <a:t>20</a:t>
-            </a:fld>
-            <a:endParaRPr dirty="0"/>
-          </a:p>
-        </p:txBody>
-      </p:sp>
-    </p:spTree>
-    <p:extLst>
-      <p:ext uri="{BB962C8B-B14F-4D97-AF65-F5344CB8AC3E}">
-        <p14:creationId xmlns:p14="http://schemas.microsoft.com/office/powerpoint/2010/main" val="2884851122"/>
-      </p:ext>
-    </p:extLst>
-  </p:cSld>
-  <p:clrMapOvr>
-    <a:masterClrMapping/>
-  </p:clrMapOvr>
-</p:sld>
-</file>
-
-<file path=ppt/slides/slide21.xml><?xml version="1.0" encoding="utf-8"?>
-<p:sld xmlns:a="http://schemas.openxmlformats.org/drawingml/2006/main" xmlns:r="http://schemas.openxmlformats.org/officeDocument/2006/relationships" xmlns:p="http://schemas.openxmlformats.org/presentationml/2006/main">
-  <p:cSld>
-    <p:spTree>
-      <p:nvGrpSpPr>
-        <p:cNvPr id="1" name=""/>
-        <p:cNvGrpSpPr/>
-        <p:nvPr/>
-      </p:nvGrpSpPr>
-      <p:grpSpPr>
-        <a:xfrm>
-          <a:off x="0" y="0"/>
-          <a:ext cx="0" cy="0"/>
-          <a:chOff x="0" y="0"/>
-          <a:chExt cx="0" cy="0"/>
-        </a:xfrm>
-      </p:grpSpPr>
-      <p:sp>
-        <p:nvSpPr>
-          <p:cNvPr id="2" name="Title 1"/>
-          <p:cNvSpPr>
-            <a:spLocks noGrp="1"/>
-          </p:cNvSpPr>
-          <p:nvPr>
-            <p:ph type="title"/>
-          </p:nvPr>
-        </p:nvSpPr>
-        <p:spPr/>
-        <p:txBody>
-          <a:bodyPr/>
-          <a:lstStyle/>
-          <a:p>
-            <a:r>
               <a:rPr lang="en-US" smtClean="0"/>
               <a:t>Task </a:t>
             </a:r>
@@ -10654,7 +10348,7 @@
             <a:fld id="{B945A87F-2CE4-4B6D-B6BF-F6BF6C5CB292}" type="slidenum">
               <a:rPr smtClean="0"/>
               <a:pPr/>
-              <a:t>21</a:t>
+              <a:t>20</a:t>
             </a:fld>
             <a:endParaRPr dirty="0"/>
           </a:p>
@@ -12020,16 +11714,86 @@
           <a:lstStyle/>
           <a:p>
             <a:r>
+              <a:rPr lang="en-US" dirty="0" err="1"/>
+              <a:t>Truthy</a:t>
+            </a:r>
+            <a:r>
+              <a:rPr lang="en-US" dirty="0"/>
+              <a:t> &amp; </a:t>
+            </a:r>
+            <a:r>
+              <a:rPr lang="en-US" dirty="0" err="1"/>
+              <a:t>falsy</a:t>
+            </a:r>
+            <a:endParaRPr lang="en-US" dirty="0"/>
+          </a:p>
+        </p:txBody>
+      </p:sp>
+      <p:sp>
+        <p:nvSpPr>
+          <p:cNvPr id="4" name="Date Placeholder 3"/>
+          <p:cNvSpPr>
+            <a:spLocks noGrp="1"/>
+          </p:cNvSpPr>
+          <p:nvPr>
+            <p:ph type="dt" sz="half" idx="10"/>
+          </p:nvPr>
+        </p:nvSpPr>
+        <p:spPr/>
+        <p:txBody>
+          <a:bodyPr/>
+          <a:lstStyle/>
+          <a:p>
+            <a:r>
+              <a:rPr lang="en-US" dirty="0" smtClean="0"/>
+              <a:t>14. August 2015</a:t>
+            </a:r>
+            <a:endParaRPr lang="en-US" dirty="0"/>
+          </a:p>
+        </p:txBody>
+      </p:sp>
+      <p:sp>
+        <p:nvSpPr>
+          <p:cNvPr id="7" name="Footer Placeholder 6"/>
+          <p:cNvSpPr>
+            <a:spLocks noGrp="1"/>
+          </p:cNvSpPr>
+          <p:nvPr>
+            <p:ph type="ftr" sz="quarter" idx="11"/>
+          </p:nvPr>
+        </p:nvSpPr>
+        <p:spPr/>
+        <p:txBody>
+          <a:bodyPr/>
+          <a:lstStyle/>
+          <a:p>
+            <a:r>
               <a:rPr lang="en-US" dirty="0" err="1" smtClean="0"/>
-              <a:t>Truthy</a:t>
-            </a:r>
-            <a:r>
-              <a:rPr lang="en-US" dirty="0" smtClean="0"/>
-              <a:t> &amp; </a:t>
+              <a:t>Javascript</a:t>
+            </a:r>
+            <a:r>
+              <a:rPr lang="en-US" dirty="0" smtClean="0"/>
+              <a:t> Basics | </a:t>
             </a:r>
             <a:r>
               <a:rPr lang="en-US" dirty="0" err="1" smtClean="0"/>
-              <a:t>falsy</a:t>
+              <a:t>nesp</a:t>
+            </a:r>
+            <a:r>
+              <a:rPr lang="en-US" dirty="0" smtClean="0"/>
+              <a:t>, </a:t>
+            </a:r>
+            <a:r>
+              <a:rPr lang="en-US" dirty="0" err="1" smtClean="0"/>
+              <a:t>stmi</a:t>
+            </a:r>
+            <a:r>
+              <a:rPr lang="en-US" dirty="0" smtClean="0"/>
+              <a:t>, </a:t>
+            </a:r>
+            <a:r>
+              <a:rPr lang="en-US" dirty="0" err="1" smtClean="0"/>
+              <a:t>mabo</a:t>
             </a:r>
             <a:endParaRPr lang="en-US" dirty="0"/>
           </a:p>
@@ -12037,7 +11801,35 @@
       </p:sp>
       <p:sp>
         <p:nvSpPr>
-          <p:cNvPr id="3" name="Content Placeholder 2"/>
+          <p:cNvPr id="9" name="Slide Number Placeholder 8"/>
+          <p:cNvSpPr>
+            <a:spLocks noGrp="1"/>
+          </p:cNvSpPr>
+          <p:nvPr>
+            <p:ph type="sldNum" sz="quarter" idx="12"/>
+          </p:nvPr>
+        </p:nvSpPr>
+        <p:spPr/>
+        <p:txBody>
+          <a:bodyPr/>
+          <a:lstStyle/>
+          <a:p>
+            <a:r>
+              <a:rPr lang="en-GB" smtClean="0"/>
+              <a:t>Slide </a:t>
+            </a:r>
+            <a:fld id="{B945A87F-2CE4-4B6D-B6BF-F6BF6C5CB292}" type="slidenum">
+              <a:rPr smtClean="0"/>
+              <a:pPr/>
+              <a:t>8</a:t>
+            </a:fld>
+            <a:endParaRPr dirty="0"/>
+          </a:p>
+        </p:txBody>
+      </p:sp>
+      <p:sp>
+        <p:nvSpPr>
+          <p:cNvPr id="10" name="Content Placeholder 2"/>
           <p:cNvSpPr>
             <a:spLocks noGrp="1"/>
           </p:cNvSpPr>
@@ -12173,99 +11965,7 @@
       </p:sp>
       <p:sp>
         <p:nvSpPr>
-          <p:cNvPr id="6" name="Text Placeholder 5"/>
-          <p:cNvSpPr>
-            <a:spLocks noGrp="1"/>
-          </p:cNvSpPr>
-          <p:nvPr>
-            <p:ph type="body" sz="quarter" idx="13"/>
-          </p:nvPr>
-        </p:nvSpPr>
-        <p:spPr/>
-        <p:txBody>
-          <a:bodyPr/>
-          <a:lstStyle/>
-          <a:p>
-            <a:endParaRPr lang="en-US" dirty="0"/>
-          </a:p>
-        </p:txBody>
-      </p:sp>
-      <p:sp>
-        <p:nvSpPr>
-          <p:cNvPr id="9" name="Footer Placeholder 8"/>
-          <p:cNvSpPr>
-            <a:spLocks noGrp="1"/>
-          </p:cNvSpPr>
-          <p:nvPr>
-            <p:ph type="ftr" sz="quarter" idx="11"/>
-          </p:nvPr>
-        </p:nvSpPr>
-        <p:spPr/>
-        <p:txBody>
-          <a:bodyPr/>
-          <a:lstStyle/>
-          <a:p>
-            <a:r>
-              <a:rPr lang="de-CH" smtClean="0"/>
-              <a:t>Javascript Basics | nesp, stmi, mabo</a:t>
-            </a:r>
-            <a:endParaRPr lang="de-CH" dirty="0"/>
-          </a:p>
-        </p:txBody>
-      </p:sp>
-      <p:sp>
-        <p:nvSpPr>
-          <p:cNvPr id="10" name="Date Placeholder 9"/>
-          <p:cNvSpPr>
-            <a:spLocks noGrp="1"/>
-          </p:cNvSpPr>
-          <p:nvPr>
-            <p:ph type="dt" sz="half" idx="10"/>
-          </p:nvPr>
-        </p:nvSpPr>
-        <p:spPr/>
-        <p:txBody>
-          <a:bodyPr/>
-          <a:lstStyle/>
-          <a:p>
-            <a:r>
-              <a:rPr lang="de-CH" smtClean="0"/>
-              <a:t>14. August 2015</a:t>
-            </a:r>
-            <a:endParaRPr lang="de-CH" dirty="0"/>
-          </a:p>
-        </p:txBody>
-      </p:sp>
-      <p:sp>
-        <p:nvSpPr>
-          <p:cNvPr id="11" name="Slide Number Placeholder 10"/>
-          <p:cNvSpPr>
-            <a:spLocks noGrp="1"/>
-          </p:cNvSpPr>
-          <p:nvPr>
-            <p:ph type="sldNum" sz="quarter" idx="12"/>
-          </p:nvPr>
-        </p:nvSpPr>
-        <p:spPr/>
-        <p:txBody>
-          <a:bodyPr/>
-          <a:lstStyle/>
-          <a:p>
-            <a:r>
-              <a:rPr lang="de-CH" smtClean="0"/>
-              <a:t>Slide </a:t>
-            </a:r>
-            <a:fld id="{FB565871-C227-4467-8A69-9EBAF738B0FF}" type="slidenum">
-              <a:rPr lang="de-CH" smtClean="0"/>
-              <a:t>8</a:t>
-            </a:fld>
-            <a:endParaRPr lang="de-CH" dirty="0"/>
-          </a:p>
-        </p:txBody>
-      </p:sp>
-      <p:sp>
-        <p:nvSpPr>
-          <p:cNvPr id="8" name="Content Placeholder 2"/>
+          <p:cNvPr id="11" name="Content Placeholder 2"/>
           <p:cNvSpPr txBox="1">
             <a:spLocks/>
           </p:cNvSpPr>
@@ -12563,7 +12263,7 @@
     </p:spTree>
     <p:extLst>
       <p:ext uri="{BB962C8B-B14F-4D97-AF65-F5344CB8AC3E}">
-        <p14:creationId xmlns:p14="http://schemas.microsoft.com/office/powerpoint/2010/main" val="2279230263"/>
+        <p14:creationId xmlns:p14="http://schemas.microsoft.com/office/powerpoint/2010/main" val="2884851122"/>
       </p:ext>
     </p:extLst>
   </p:cSld>

</xml_diff>

<commit_message>
updated javascript basics ppt - fix on slide 8
</commit_message>
<xml_diff>
--- a/javascript_basics/JavaScript Basics - basics/JavaScript Basics - basics.pptx
+++ b/javascript_basics/JavaScript Basics - basics/JavaScript Basics - basics.pptx
@@ -327,7 +327,7 @@
               <a:rPr lang="de-DE" smtClean="0">
                 <a:latin typeface="AA Zuehlke" pitchFamily="2" charset="0"/>
               </a:rPr>
-              <a:t>04.09.2015</a:t>
+              <a:t>17.09.2015</a:t>
             </a:fld>
             <a:endParaRPr lang="de-DE">
               <a:latin typeface="AA Zuehlke" pitchFamily="2" charset="0"/>
@@ -505,7 +505,7 @@
             <a:fld id="{A6966AE6-B72D-4967-9CA3-8469D2863705}" type="datetimeFigureOut">
               <a:rPr lang="en-US" smtClean="0"/>
               <a:pPr/>
-              <a:t>9/4/2015</a:t>
+              <a:t>9/17/2015</a:t>
             </a:fld>
             <a:endParaRPr lang="en-US" dirty="0"/>
           </a:p>
@@ -7403,15 +7403,7 @@
             </a:pPr>
             <a:r>
               <a:rPr lang="en-US" dirty="0" smtClean="0"/>
-              <a:t>if…else   </a:t>
-            </a:r>
-            <a:r>
-              <a:rPr lang="en-US" dirty="0" smtClean="0"/>
-              <a:t>(think about </a:t>
-            </a:r>
-            <a:r>
-              <a:rPr lang="en-US" dirty="0" smtClean="0"/>
-              <a:t>== vs ===)</a:t>
+              <a:t>if…else   (think about == vs ===)</a:t>
             </a:r>
           </a:p>
           <a:p>
@@ -12243,8 +12235,17 @@
             </a:pPr>
             <a:r>
               <a:rPr lang="en-US" dirty="0" smtClean="0"/>
-              <a:t>    // will not execute</a:t>
-            </a:r>
+              <a:t>    // </a:t>
+            </a:r>
+            <a:r>
+              <a:rPr lang="en-US" smtClean="0"/>
+              <a:t>will </a:t>
+            </a:r>
+            <a:r>
+              <a:rPr lang="en-US" smtClean="0"/>
+              <a:t>execute</a:t>
+            </a:r>
+            <a:endParaRPr lang="en-US" dirty="0" smtClean="0"/>
           </a:p>
           <a:p>
             <a:pPr lvl="1" indent="0">

</xml_diff>